<commit_message>
Developed data management strategy
</commit_message>
<xml_diff>
--- a/doc/Data management practices.pptx
+++ b/doc/Data management practices.pptx
@@ -5,10 +5,17 @@
     <p:sldMasterId id="2147483648" r:id="rId1"/>
   </p:sldMasterIdLst>
   <p:sldIdLst>
-    <p:sldId id="256" r:id="rId2"/>
+    <p:sldId id="259" r:id="rId2"/>
+    <p:sldId id="257" r:id="rId3"/>
+    <p:sldId id="258" r:id="rId4"/>
+    <p:sldId id="263" r:id="rId5"/>
+    <p:sldId id="264" r:id="rId6"/>
+    <p:sldId id="265" r:id="rId7"/>
+    <p:sldId id="260" r:id="rId8"/>
+    <p:sldId id="261" r:id="rId9"/>
   </p:sldIdLst>
   <p:sldSz cx="12192000" cy="6858000"/>
-  <p:notesSz cx="6858000" cy="9144000"/>
+  <p:notesSz cx="7023100" cy="9309100"/>
   <p:defaultTextStyle>
     <a:defPPr>
       <a:defRPr lang="en-US"/>
@@ -104,6 +111,11 @@
       </a:defRPr>
     </a:lvl9pPr>
   </p:defaultTextStyle>
+  <p:extLst>
+    <p:ext uri="{EFAFB233-063F-42B5-8137-9DF3F51BA10A}">
+      <p15:sldGuideLst xmlns:p15="http://schemas.microsoft.com/office/powerpoint/2012/main"/>
+    </p:ext>
+  </p:extLst>
 </p:presentation>
 </file>
 
@@ -254,7 +266,7 @@
           <a:p>
             <a:fld id="{A6E35EC9-3BB3-4EBA-A7F7-E7BB8A4FEB6B}" type="datetimeFigureOut">
               <a:rPr lang="en-US" smtClean="0"/>
-              <a:t>6/29/2023</a:t>
+              <a:t>9/6/2023</a:t>
             </a:fld>
             <a:endParaRPr lang="en-US"/>
           </a:p>
@@ -452,7 +464,7 @@
           <a:p>
             <a:fld id="{A6E35EC9-3BB3-4EBA-A7F7-E7BB8A4FEB6B}" type="datetimeFigureOut">
               <a:rPr lang="en-US" smtClean="0"/>
-              <a:t>6/29/2023</a:t>
+              <a:t>9/6/2023</a:t>
             </a:fld>
             <a:endParaRPr lang="en-US"/>
           </a:p>
@@ -660,7 +672,7 @@
           <a:p>
             <a:fld id="{A6E35EC9-3BB3-4EBA-A7F7-E7BB8A4FEB6B}" type="datetimeFigureOut">
               <a:rPr lang="en-US" smtClean="0"/>
-              <a:t>6/29/2023</a:t>
+              <a:t>9/6/2023</a:t>
             </a:fld>
             <a:endParaRPr lang="en-US"/>
           </a:p>
@@ -858,7 +870,7 @@
           <a:p>
             <a:fld id="{A6E35EC9-3BB3-4EBA-A7F7-E7BB8A4FEB6B}" type="datetimeFigureOut">
               <a:rPr lang="en-US" smtClean="0"/>
-              <a:t>6/29/2023</a:t>
+              <a:t>9/6/2023</a:t>
             </a:fld>
             <a:endParaRPr lang="en-US"/>
           </a:p>
@@ -1133,7 +1145,7 @@
           <a:p>
             <a:fld id="{A6E35EC9-3BB3-4EBA-A7F7-E7BB8A4FEB6B}" type="datetimeFigureOut">
               <a:rPr lang="en-US" smtClean="0"/>
-              <a:t>6/29/2023</a:t>
+              <a:t>9/6/2023</a:t>
             </a:fld>
             <a:endParaRPr lang="en-US"/>
           </a:p>
@@ -1398,7 +1410,7 @@
           <a:p>
             <a:fld id="{A6E35EC9-3BB3-4EBA-A7F7-E7BB8A4FEB6B}" type="datetimeFigureOut">
               <a:rPr lang="en-US" smtClean="0"/>
-              <a:t>6/29/2023</a:t>
+              <a:t>9/6/2023</a:t>
             </a:fld>
             <a:endParaRPr lang="en-US"/>
           </a:p>
@@ -1810,7 +1822,7 @@
           <a:p>
             <a:fld id="{A6E35EC9-3BB3-4EBA-A7F7-E7BB8A4FEB6B}" type="datetimeFigureOut">
               <a:rPr lang="en-US" smtClean="0"/>
-              <a:t>6/29/2023</a:t>
+              <a:t>9/6/2023</a:t>
             </a:fld>
             <a:endParaRPr lang="en-US"/>
           </a:p>
@@ -1951,7 +1963,7 @@
           <a:p>
             <a:fld id="{A6E35EC9-3BB3-4EBA-A7F7-E7BB8A4FEB6B}" type="datetimeFigureOut">
               <a:rPr lang="en-US" smtClean="0"/>
-              <a:t>6/29/2023</a:t>
+              <a:t>9/6/2023</a:t>
             </a:fld>
             <a:endParaRPr lang="en-US"/>
           </a:p>
@@ -2064,7 +2076,7 @@
           <a:p>
             <a:fld id="{A6E35EC9-3BB3-4EBA-A7F7-E7BB8A4FEB6B}" type="datetimeFigureOut">
               <a:rPr lang="en-US" smtClean="0"/>
-              <a:t>6/29/2023</a:t>
+              <a:t>9/6/2023</a:t>
             </a:fld>
             <a:endParaRPr lang="en-US"/>
           </a:p>
@@ -2375,7 +2387,7 @@
           <a:p>
             <a:fld id="{A6E35EC9-3BB3-4EBA-A7F7-E7BB8A4FEB6B}" type="datetimeFigureOut">
               <a:rPr lang="en-US" smtClean="0"/>
-              <a:t>6/29/2023</a:t>
+              <a:t>9/6/2023</a:t>
             </a:fld>
             <a:endParaRPr lang="en-US"/>
           </a:p>
@@ -2663,7 +2675,7 @@
           <a:p>
             <a:fld id="{A6E35EC9-3BB3-4EBA-A7F7-E7BB8A4FEB6B}" type="datetimeFigureOut">
               <a:rPr lang="en-US" smtClean="0"/>
-              <a:t>6/29/2023</a:t>
+              <a:t>9/6/2023</a:t>
             </a:fld>
             <a:endParaRPr lang="en-US"/>
           </a:p>
@@ -2904,7 +2916,7 @@
           <a:p>
             <a:fld id="{A6E35EC9-3BB3-4EBA-A7F7-E7BB8A4FEB6B}" type="datetimeFigureOut">
               <a:rPr lang="en-US" smtClean="0"/>
-              <a:t>6/29/2023</a:t>
+              <a:t>9/6/2023</a:t>
             </a:fld>
             <a:endParaRPr lang="en-US"/>
           </a:p>
@@ -3323,10 +3335,344 @@
       </p:grpSpPr>
       <p:sp>
         <p:nvSpPr>
+          <p:cNvPr id="2" name="Title 1">
+            <a:extLst>
+              <a:ext uri="{FF2B5EF4-FFF2-40B4-BE49-F238E27FC236}">
+                <a16:creationId xmlns:a16="http://schemas.microsoft.com/office/drawing/2014/main" id="{89B1FF4F-B02B-682F-44E4-E9D1254CFC04}"/>
+              </a:ext>
+            </a:extLst>
+          </p:cNvPr>
+          <p:cNvSpPr>
+            <a:spLocks noGrp="1"/>
+          </p:cNvSpPr>
+          <p:nvPr>
+            <p:ph type="ctrTitle"/>
+          </p:nvPr>
+        </p:nvSpPr>
+        <p:spPr>
+          <a:xfrm>
+            <a:off x="1524000" y="1969082"/>
+            <a:ext cx="9144000" cy="640928"/>
+          </a:xfrm>
+        </p:spPr>
+        <p:txBody>
+          <a:bodyPr>
+            <a:normAutofit/>
+          </a:bodyPr>
+          <a:lstStyle/>
+          <a:p>
+            <a:r>
+              <a:rPr lang="fr-CA" sz="4000" b="1" dirty="0"/>
+              <a:t>Field </a:t>
+            </a:r>
+            <a:r>
+              <a:rPr lang="fr-CA" sz="4000" b="1" dirty="0" err="1"/>
+              <a:t>study</a:t>
+            </a:r>
+            <a:r>
+              <a:rPr lang="fr-CA" sz="4000" b="1" dirty="0"/>
+              <a:t> planning and data management</a:t>
+            </a:r>
+            <a:endParaRPr lang="en-US" sz="4000" b="1" dirty="0"/>
+          </a:p>
+        </p:txBody>
+      </p:sp>
+      <p:sp>
+        <p:nvSpPr>
+          <p:cNvPr id="3" name="Subtitle 2">
+            <a:extLst>
+              <a:ext uri="{FF2B5EF4-FFF2-40B4-BE49-F238E27FC236}">
+                <a16:creationId xmlns:a16="http://schemas.microsoft.com/office/drawing/2014/main" id="{B64196FB-FCDE-1C52-064F-CCAB52FEB6AF}"/>
+              </a:ext>
+            </a:extLst>
+          </p:cNvPr>
+          <p:cNvSpPr>
+            <a:spLocks noGrp="1"/>
+          </p:cNvSpPr>
+          <p:nvPr>
+            <p:ph type="subTitle" idx="1"/>
+          </p:nvPr>
+        </p:nvSpPr>
+        <p:spPr/>
+        <p:txBody>
+          <a:bodyPr/>
+          <a:lstStyle/>
+          <a:p>
+            <a:endParaRPr lang="en-US" dirty="0"/>
+          </a:p>
+        </p:txBody>
+      </p:sp>
+    </p:spTree>
+    <p:extLst>
+      <p:ext uri="{BB962C8B-B14F-4D97-AF65-F5344CB8AC3E}">
+        <p14:creationId xmlns:p14="http://schemas.microsoft.com/office/powerpoint/2010/main" val="2959659212"/>
+      </p:ext>
+    </p:extLst>
+  </p:cSld>
+  <p:clrMapOvr>
+    <a:masterClrMapping/>
+  </p:clrMapOvr>
+</p:sld>
+</file>
+
+<file path=ppt/slides/slide2.xml><?xml version="1.0" encoding="utf-8"?>
+<p:sld xmlns:a="http://schemas.openxmlformats.org/drawingml/2006/main" xmlns:r="http://schemas.openxmlformats.org/officeDocument/2006/relationships" xmlns:p="http://schemas.openxmlformats.org/presentationml/2006/main">
+  <p:cSld>
+    <p:spTree>
+      <p:nvGrpSpPr>
+        <p:cNvPr id="1" name=""/>
+        <p:cNvGrpSpPr/>
+        <p:nvPr/>
+      </p:nvGrpSpPr>
+      <p:grpSpPr>
+        <a:xfrm>
+          <a:off x="0" y="0"/>
+          <a:ext cx="0" cy="0"/>
+          <a:chOff x="0" y="0"/>
+          <a:chExt cx="0" cy="0"/>
+        </a:xfrm>
+      </p:grpSpPr>
+      <p:sp>
+        <p:nvSpPr>
+          <p:cNvPr id="2" name="Title 1">
+            <a:extLst>
+              <a:ext uri="{FF2B5EF4-FFF2-40B4-BE49-F238E27FC236}">
+                <a16:creationId xmlns:a16="http://schemas.microsoft.com/office/drawing/2014/main" id="{65688375-BB4A-5B1A-A4F6-AC443AD1563D}"/>
+              </a:ext>
+            </a:extLst>
+          </p:cNvPr>
+          <p:cNvSpPr>
+            <a:spLocks noGrp="1"/>
+          </p:cNvSpPr>
+          <p:nvPr>
+            <p:ph type="title"/>
+          </p:nvPr>
+        </p:nvSpPr>
+        <p:spPr>
+          <a:xfrm>
+            <a:off x="586274" y="392403"/>
+            <a:ext cx="10899710" cy="577267"/>
+          </a:xfrm>
+        </p:spPr>
+        <p:txBody>
+          <a:bodyPr>
+            <a:noAutofit/>
+          </a:bodyPr>
+          <a:lstStyle/>
+          <a:p>
+            <a:r>
+              <a:rPr lang="en-US" sz="3600" b="1" dirty="0">
+                <a:latin typeface="+mn-lt"/>
+              </a:rPr>
+              <a:t>Data management: </a:t>
+            </a:r>
+          </a:p>
+        </p:txBody>
+      </p:sp>
+      <p:sp>
+        <p:nvSpPr>
+          <p:cNvPr id="3" name="Content Placeholder 2">
+            <a:extLst>
+              <a:ext uri="{FF2B5EF4-FFF2-40B4-BE49-F238E27FC236}">
+                <a16:creationId xmlns:a16="http://schemas.microsoft.com/office/drawing/2014/main" id="{C1F8576F-C3B3-A45B-1609-1855D74A7E59}"/>
+              </a:ext>
+            </a:extLst>
+          </p:cNvPr>
+          <p:cNvSpPr>
+            <a:spLocks noGrp="1"/>
+          </p:cNvSpPr>
+          <p:nvPr>
+            <p:ph idx="1"/>
+          </p:nvPr>
+        </p:nvSpPr>
+        <p:spPr>
+          <a:xfrm>
+            <a:off x="586274" y="1253331"/>
+            <a:ext cx="11116368" cy="4351338"/>
+          </a:xfrm>
+        </p:spPr>
+        <p:txBody>
+          <a:bodyPr/>
+          <a:lstStyle/>
+          <a:p>
+            <a:r>
+              <a:rPr lang="en-CA" b="0" i="0" dirty="0">
+                <a:solidFill>
+                  <a:srgbClr val="202124"/>
+                </a:solidFill>
+                <a:effectLst/>
+              </a:rPr>
+              <a:t>the practice of </a:t>
+            </a:r>
+            <a:r>
+              <a:rPr lang="en-CA" b="1" i="0" dirty="0">
+                <a:solidFill>
+                  <a:srgbClr val="040C28"/>
+                </a:solidFill>
+                <a:effectLst/>
+              </a:rPr>
+              <a:t>collecting</a:t>
+            </a:r>
+            <a:r>
+              <a:rPr lang="en-CA" b="0" i="0" dirty="0">
+                <a:solidFill>
+                  <a:srgbClr val="040C28"/>
+                </a:solidFill>
+                <a:effectLst/>
+              </a:rPr>
+              <a:t>, </a:t>
+            </a:r>
+            <a:r>
+              <a:rPr lang="en-CA" b="1" i="0" dirty="0">
+                <a:solidFill>
+                  <a:srgbClr val="040C28"/>
+                </a:solidFill>
+                <a:effectLst/>
+              </a:rPr>
+              <a:t>organizing</a:t>
+            </a:r>
+            <a:r>
+              <a:rPr lang="en-CA" b="0" i="0" dirty="0">
+                <a:solidFill>
+                  <a:srgbClr val="040C28"/>
+                </a:solidFill>
+                <a:effectLst/>
+              </a:rPr>
+              <a:t>, </a:t>
+            </a:r>
+            <a:r>
+              <a:rPr lang="en-CA" b="1" i="0" dirty="0">
+                <a:solidFill>
+                  <a:srgbClr val="040C28"/>
+                </a:solidFill>
+                <a:effectLst/>
+              </a:rPr>
+              <a:t>protecting</a:t>
+            </a:r>
+            <a:r>
+              <a:rPr lang="en-CA" b="0" i="0" dirty="0">
+                <a:solidFill>
+                  <a:srgbClr val="040C28"/>
+                </a:solidFill>
+                <a:effectLst/>
+              </a:rPr>
+              <a:t>, and </a:t>
+            </a:r>
+            <a:r>
+              <a:rPr lang="en-CA" b="1" i="0" dirty="0">
+                <a:solidFill>
+                  <a:srgbClr val="040C28"/>
+                </a:solidFill>
+                <a:effectLst/>
+              </a:rPr>
+              <a:t>storing</a:t>
+            </a:r>
+            <a:r>
+              <a:rPr lang="en-CA" b="0" i="0" dirty="0">
+                <a:solidFill>
+                  <a:srgbClr val="040C28"/>
+                </a:solidFill>
+                <a:effectLst/>
+              </a:rPr>
+              <a:t> data so it can be </a:t>
+            </a:r>
+            <a:r>
+              <a:rPr lang="en-CA" b="1" i="0" dirty="0">
+                <a:solidFill>
+                  <a:srgbClr val="040C28"/>
+                </a:solidFill>
+                <a:effectLst/>
+              </a:rPr>
+              <a:t>analyzed</a:t>
+            </a:r>
+            <a:r>
+              <a:rPr lang="en-CA" b="0" i="0" dirty="0">
+                <a:solidFill>
+                  <a:srgbClr val="040C28"/>
+                </a:solidFill>
+                <a:effectLst/>
+              </a:rPr>
+              <a:t>.</a:t>
+            </a:r>
+          </a:p>
+          <a:p>
+            <a:endParaRPr lang="en-US" dirty="0"/>
+          </a:p>
+        </p:txBody>
+      </p:sp>
+    </p:spTree>
+    <p:extLst>
+      <p:ext uri="{BB962C8B-B14F-4D97-AF65-F5344CB8AC3E}">
+        <p14:creationId xmlns:p14="http://schemas.microsoft.com/office/powerpoint/2010/main" val="1243487414"/>
+      </p:ext>
+    </p:extLst>
+  </p:cSld>
+  <p:clrMapOvr>
+    <a:masterClrMapping/>
+  </p:clrMapOvr>
+</p:sld>
+</file>
+
+<file path=ppt/slides/slide3.xml><?xml version="1.0" encoding="utf-8"?>
+<p:sld xmlns:a="http://schemas.openxmlformats.org/drawingml/2006/main" xmlns:r="http://schemas.openxmlformats.org/officeDocument/2006/relationships" xmlns:p="http://schemas.openxmlformats.org/presentationml/2006/main">
+  <p:cSld>
+    <p:spTree>
+      <p:nvGrpSpPr>
+        <p:cNvPr id="1" name=""/>
+        <p:cNvGrpSpPr/>
+        <p:nvPr/>
+      </p:nvGrpSpPr>
+      <p:grpSpPr>
+        <a:xfrm>
+          <a:off x="0" y="0"/>
+          <a:ext cx="0" cy="0"/>
+          <a:chOff x="0" y="0"/>
+          <a:chExt cx="0" cy="0"/>
+        </a:xfrm>
+      </p:grpSpPr>
+      <p:sp>
+        <p:nvSpPr>
+          <p:cNvPr id="2" name="Title 1">
+            <a:extLst>
+              <a:ext uri="{FF2B5EF4-FFF2-40B4-BE49-F238E27FC236}">
+                <a16:creationId xmlns:a16="http://schemas.microsoft.com/office/drawing/2014/main" id="{3E303F73-2AEE-BBCB-07CF-733C870B59F8}"/>
+              </a:ext>
+            </a:extLst>
+          </p:cNvPr>
+          <p:cNvSpPr>
+            <a:spLocks noGrp="1"/>
+          </p:cNvSpPr>
+          <p:nvPr>
+            <p:ph type="title"/>
+          </p:nvPr>
+        </p:nvSpPr>
+        <p:spPr>
+          <a:xfrm>
+            <a:off x="520117" y="198452"/>
+            <a:ext cx="10833683" cy="649943"/>
+          </a:xfrm>
+        </p:spPr>
+        <p:txBody>
+          <a:bodyPr>
+            <a:normAutofit/>
+          </a:bodyPr>
+          <a:lstStyle/>
+          <a:p>
+            <a:r>
+              <a:rPr lang="en-US" sz="3600" b="1" dirty="0">
+                <a:latin typeface="+mn-lt"/>
+              </a:rPr>
+              <a:t>Planning:</a:t>
+            </a:r>
+          </a:p>
+        </p:txBody>
+      </p:sp>
+      <p:sp>
+        <p:nvSpPr>
           <p:cNvPr id="4" name="TextBox 3">
             <a:extLst>
               <a:ext uri="{FF2B5EF4-FFF2-40B4-BE49-F238E27FC236}">
-                <a16:creationId xmlns:a16="http://schemas.microsoft.com/office/drawing/2014/main" id="{15BABAAE-A443-4590-95E6-B0DBC328EDA9}"/>
+                <a16:creationId xmlns:a16="http://schemas.microsoft.com/office/drawing/2014/main" id="{AE02FDB3-3FF4-C17A-DB4F-D0B4D299B4EC}"/>
               </a:ext>
             </a:extLst>
           </p:cNvPr>
@@ -3335,8 +3681,1462 @@
         </p:nvSpPr>
         <p:spPr>
           <a:xfrm>
-            <a:off x="9253142" y="2490505"/>
-            <a:ext cx="1241485" cy="369332"/>
+            <a:off x="520117" y="930418"/>
+            <a:ext cx="10939793" cy="3339184"/>
+          </a:xfrm>
+          <a:prstGeom prst="rect">
+            <a:avLst/>
+          </a:prstGeom>
+          <a:noFill/>
+        </p:spPr>
+        <p:txBody>
+          <a:bodyPr wrap="square" rtlCol="0">
+            <a:spAutoFit/>
+          </a:bodyPr>
+          <a:lstStyle/>
+          <a:p>
+            <a:pPr marL="342900" marR="0" lvl="0" indent="-342900">
+              <a:lnSpc>
+                <a:spcPct val="107000"/>
+              </a:lnSpc>
+              <a:spcBef>
+                <a:spcPts val="0"/>
+              </a:spcBef>
+              <a:spcAft>
+                <a:spcPts val="0"/>
+              </a:spcAft>
+              <a:buFont typeface="Symbol" panose="05050102010706020507" pitchFamily="18" charset="2"/>
+              <a:buChar char=""/>
+            </a:pPr>
+            <a:r>
+              <a:rPr lang="en-US" sz="1800" b="1" dirty="0">
+                <a:effectLst/>
+                <a:latin typeface="Calibri" panose="020F0502020204030204" pitchFamily="34" charset="0"/>
+                <a:ea typeface="Calibri" panose="020F0502020204030204" pitchFamily="34" charset="0"/>
+                <a:cs typeface="Times New Roman" panose="02020603050405020304" pitchFamily="18" charset="0"/>
+              </a:rPr>
+              <a:t>What</a:t>
+            </a:r>
+            <a:r>
+              <a:rPr lang="en-US" sz="1800" dirty="0">
+                <a:effectLst/>
+                <a:latin typeface="Calibri" panose="020F0502020204030204" pitchFamily="34" charset="0"/>
+                <a:ea typeface="Calibri" panose="020F0502020204030204" pitchFamily="34" charset="0"/>
+                <a:cs typeface="Times New Roman" panose="02020603050405020304" pitchFamily="18" charset="0"/>
+              </a:rPr>
+              <a:t> do you want to know? Provide and prioritize main research questions and goals.</a:t>
+            </a:r>
+          </a:p>
+          <a:p>
+            <a:pPr marL="342900" marR="0" lvl="0" indent="-342900">
+              <a:lnSpc>
+                <a:spcPct val="107000"/>
+              </a:lnSpc>
+              <a:spcBef>
+                <a:spcPts val="0"/>
+              </a:spcBef>
+              <a:spcAft>
+                <a:spcPts val="0"/>
+              </a:spcAft>
+              <a:buFont typeface="Symbol" panose="05050102010706020507" pitchFamily="18" charset="2"/>
+              <a:buChar char=""/>
+            </a:pPr>
+            <a:r>
+              <a:rPr lang="en-US" sz="1800" b="1" dirty="0">
+                <a:effectLst/>
+                <a:latin typeface="Calibri" panose="020F0502020204030204" pitchFamily="34" charset="0"/>
+                <a:ea typeface="Calibri" panose="020F0502020204030204" pitchFamily="34" charset="0"/>
+                <a:cs typeface="Times New Roman" panose="02020603050405020304" pitchFamily="18" charset="0"/>
+              </a:rPr>
+              <a:t>Why</a:t>
+            </a:r>
+            <a:r>
+              <a:rPr lang="en-US" sz="1800" dirty="0">
+                <a:effectLst/>
+                <a:latin typeface="Calibri" panose="020F0502020204030204" pitchFamily="34" charset="0"/>
+                <a:ea typeface="Calibri" panose="020F0502020204030204" pitchFamily="34" charset="0"/>
+                <a:cs typeface="Times New Roman" panose="02020603050405020304" pitchFamily="18" charset="0"/>
+              </a:rPr>
+              <a:t> do you want to know? What is the intended purpose of the results? </a:t>
+            </a:r>
+          </a:p>
+          <a:p>
+            <a:pPr marL="342900" marR="0" lvl="0" indent="-342900">
+              <a:lnSpc>
+                <a:spcPct val="107000"/>
+              </a:lnSpc>
+              <a:spcBef>
+                <a:spcPts val="0"/>
+              </a:spcBef>
+              <a:spcAft>
+                <a:spcPts val="0"/>
+              </a:spcAft>
+              <a:buFont typeface="Symbol" panose="05050102010706020507" pitchFamily="18" charset="2"/>
+              <a:buChar char=""/>
+            </a:pPr>
+            <a:r>
+              <a:rPr lang="en-US" sz="1800" b="1" dirty="0">
+                <a:effectLst/>
+                <a:latin typeface="Calibri" panose="020F0502020204030204" pitchFamily="34" charset="0"/>
+                <a:ea typeface="Calibri" panose="020F0502020204030204" pitchFamily="34" charset="0"/>
+                <a:cs typeface="Times New Roman" panose="02020603050405020304" pitchFamily="18" charset="0"/>
+              </a:rPr>
+              <a:t>When</a:t>
+            </a:r>
+            <a:r>
+              <a:rPr lang="en-US" sz="1800" dirty="0">
+                <a:effectLst/>
+                <a:latin typeface="Calibri" panose="020F0502020204030204" pitchFamily="34" charset="0"/>
+                <a:ea typeface="Calibri" panose="020F0502020204030204" pitchFamily="34" charset="0"/>
+                <a:cs typeface="Times New Roman" panose="02020603050405020304" pitchFamily="18" charset="0"/>
+              </a:rPr>
+              <a:t> and </a:t>
+            </a:r>
+            <a:r>
+              <a:rPr lang="en-US" sz="1800" b="1" dirty="0">
+                <a:effectLst/>
+                <a:latin typeface="Calibri" panose="020F0502020204030204" pitchFamily="34" charset="0"/>
+                <a:ea typeface="Calibri" panose="020F0502020204030204" pitchFamily="34" charset="0"/>
+                <a:cs typeface="Times New Roman" panose="02020603050405020304" pitchFamily="18" charset="0"/>
+              </a:rPr>
+              <a:t>where</a:t>
+            </a:r>
+            <a:r>
+              <a:rPr lang="en-US" sz="1800" dirty="0">
+                <a:effectLst/>
+                <a:latin typeface="Calibri" panose="020F0502020204030204" pitchFamily="34" charset="0"/>
+                <a:ea typeface="Calibri" panose="020F0502020204030204" pitchFamily="34" charset="0"/>
+                <a:cs typeface="Times New Roman" panose="02020603050405020304" pitchFamily="18" charset="0"/>
+              </a:rPr>
+              <a:t> are you going to conduct the study? Explain why these locations and times were chosen.</a:t>
+            </a:r>
+          </a:p>
+          <a:p>
+            <a:pPr marL="342900" marR="0" lvl="0" indent="-342900">
+              <a:lnSpc>
+                <a:spcPct val="107000"/>
+              </a:lnSpc>
+              <a:spcBef>
+                <a:spcPts val="0"/>
+              </a:spcBef>
+              <a:spcAft>
+                <a:spcPts val="0"/>
+              </a:spcAft>
+              <a:buFont typeface="Symbol" panose="05050102010706020507" pitchFamily="18" charset="2"/>
+              <a:buChar char=""/>
+            </a:pPr>
+            <a:r>
+              <a:rPr lang="en-US" sz="1800" b="1" dirty="0">
+                <a:effectLst/>
+                <a:latin typeface="Calibri" panose="020F0502020204030204" pitchFamily="34" charset="0"/>
+                <a:ea typeface="Calibri" panose="020F0502020204030204" pitchFamily="34" charset="0"/>
+                <a:cs typeface="Times New Roman" panose="02020603050405020304" pitchFamily="18" charset="0"/>
+              </a:rPr>
+              <a:t>List observation variables</a:t>
+            </a:r>
+            <a:r>
+              <a:rPr lang="en-US" sz="1800" dirty="0">
+                <a:effectLst/>
+                <a:latin typeface="Calibri" panose="020F0502020204030204" pitchFamily="34" charset="0"/>
+                <a:ea typeface="Calibri" panose="020F0502020204030204" pitchFamily="34" charset="0"/>
+                <a:cs typeface="Times New Roman" panose="02020603050405020304" pitchFamily="18" charset="0"/>
+              </a:rPr>
+              <a:t> and experimental treatments and map out their relationships (i.e. hierarchical diagram of causes and effects).</a:t>
+            </a:r>
+          </a:p>
+          <a:p>
+            <a:pPr marL="342900" marR="0" lvl="0" indent="-342900">
+              <a:lnSpc>
+                <a:spcPct val="107000"/>
+              </a:lnSpc>
+              <a:spcBef>
+                <a:spcPts val="0"/>
+              </a:spcBef>
+              <a:spcAft>
+                <a:spcPts val="0"/>
+              </a:spcAft>
+              <a:buFont typeface="Symbol" panose="05050102010706020507" pitchFamily="18" charset="2"/>
+              <a:buChar char=""/>
+            </a:pPr>
+            <a:r>
+              <a:rPr lang="en-US" sz="1800" b="1" dirty="0">
+                <a:effectLst/>
+                <a:latin typeface="Calibri" panose="020F0502020204030204" pitchFamily="34" charset="0"/>
+                <a:ea typeface="Calibri" panose="020F0502020204030204" pitchFamily="34" charset="0"/>
+                <a:cs typeface="Times New Roman" panose="02020603050405020304" pitchFamily="18" charset="0"/>
+              </a:rPr>
+              <a:t>List confounding variables</a:t>
+            </a:r>
+            <a:r>
+              <a:rPr lang="en-US" sz="1800" dirty="0">
+                <a:effectLst/>
+                <a:latin typeface="Calibri" panose="020F0502020204030204" pitchFamily="34" charset="0"/>
+                <a:ea typeface="Calibri" panose="020F0502020204030204" pitchFamily="34" charset="0"/>
+                <a:cs typeface="Times New Roman" panose="02020603050405020304" pitchFamily="18" charset="0"/>
+              </a:rPr>
+              <a:t> and discuss their possible impacts on the proposed observations, based on their likely relationships with other variables.</a:t>
+            </a:r>
+          </a:p>
+          <a:p>
+            <a:pPr marL="342900" marR="0" lvl="0" indent="-342900">
+              <a:lnSpc>
+                <a:spcPct val="107000"/>
+              </a:lnSpc>
+              <a:spcBef>
+                <a:spcPts val="0"/>
+              </a:spcBef>
+              <a:spcAft>
+                <a:spcPts val="0"/>
+              </a:spcAft>
+              <a:buFont typeface="Symbol" panose="05050102010706020507" pitchFamily="18" charset="2"/>
+              <a:buChar char=""/>
+            </a:pPr>
+            <a:r>
+              <a:rPr lang="en-US" sz="1800" b="1" dirty="0">
+                <a:effectLst/>
+                <a:latin typeface="Calibri" panose="020F0502020204030204" pitchFamily="34" charset="0"/>
+                <a:ea typeface="Calibri" panose="020F0502020204030204" pitchFamily="34" charset="0"/>
+                <a:cs typeface="Times New Roman" panose="02020603050405020304" pitchFamily="18" charset="0"/>
+              </a:rPr>
+              <a:t>How</a:t>
+            </a:r>
+            <a:r>
+              <a:rPr lang="en-US" sz="1800" dirty="0">
+                <a:effectLst/>
+                <a:latin typeface="Calibri" panose="020F0502020204030204" pitchFamily="34" charset="0"/>
+                <a:ea typeface="Calibri" panose="020F0502020204030204" pitchFamily="34" charset="0"/>
+                <a:cs typeface="Times New Roman" panose="02020603050405020304" pitchFamily="18" charset="0"/>
+              </a:rPr>
+              <a:t> are you going to answer your research questions? Will the data collected be able to answer your research questions? Outline the analytical strategy that will be used.</a:t>
+            </a:r>
+          </a:p>
+          <a:p>
+            <a:pPr marL="342900" marR="0" lvl="0" indent="-342900">
+              <a:lnSpc>
+                <a:spcPct val="107000"/>
+              </a:lnSpc>
+              <a:spcBef>
+                <a:spcPts val="0"/>
+              </a:spcBef>
+              <a:spcAft>
+                <a:spcPts val="800"/>
+              </a:spcAft>
+              <a:buFont typeface="Symbol" panose="05050102010706020507" pitchFamily="18" charset="2"/>
+              <a:buChar char=""/>
+            </a:pPr>
+            <a:r>
+              <a:rPr lang="en-US" sz="1800" b="1" dirty="0">
+                <a:effectLst/>
+                <a:latin typeface="Calibri" panose="020F0502020204030204" pitchFamily="34" charset="0"/>
+                <a:ea typeface="Calibri" panose="020F0502020204030204" pitchFamily="34" charset="0"/>
+                <a:cs typeface="Times New Roman" panose="02020603050405020304" pitchFamily="18" charset="0"/>
+              </a:rPr>
+              <a:t>Build</a:t>
+            </a:r>
+            <a:r>
+              <a:rPr lang="en-US" sz="1800" dirty="0">
+                <a:effectLst/>
+                <a:latin typeface="Calibri" panose="020F0502020204030204" pitchFamily="34" charset="0"/>
+                <a:ea typeface="Calibri" panose="020F0502020204030204" pitchFamily="34" charset="0"/>
+                <a:cs typeface="Times New Roman" panose="02020603050405020304" pitchFamily="18" charset="0"/>
+              </a:rPr>
+              <a:t> a working example of what you expect your data to look like (i.e. simulate data) and analyze the simulated data set. Try alternative assumptions. Does this model yield expected results? </a:t>
+            </a:r>
+            <a:r>
+              <a:rPr lang="en-US" sz="1800" b="1" dirty="0">
+                <a:effectLst/>
+                <a:latin typeface="Calibri" panose="020F0502020204030204" pitchFamily="34" charset="0"/>
+                <a:ea typeface="Calibri" panose="020F0502020204030204" pitchFamily="34" charset="0"/>
+                <a:cs typeface="Times New Roman" panose="02020603050405020304" pitchFamily="18" charset="0"/>
+              </a:rPr>
+              <a:t>Review the study plan</a:t>
+            </a:r>
+            <a:r>
+              <a:rPr lang="en-US" sz="1800" dirty="0">
+                <a:effectLst/>
+                <a:latin typeface="Calibri" panose="020F0502020204030204" pitchFamily="34" charset="0"/>
+                <a:ea typeface="Calibri" panose="020F0502020204030204" pitchFamily="34" charset="0"/>
+                <a:cs typeface="Times New Roman" panose="02020603050405020304" pitchFamily="18" charset="0"/>
+              </a:rPr>
+              <a:t>.</a:t>
+            </a:r>
+          </a:p>
+        </p:txBody>
+      </p:sp>
+    </p:spTree>
+    <p:extLst>
+      <p:ext uri="{BB962C8B-B14F-4D97-AF65-F5344CB8AC3E}">
+        <p14:creationId xmlns:p14="http://schemas.microsoft.com/office/powerpoint/2010/main" val="4035895724"/>
+      </p:ext>
+    </p:extLst>
+  </p:cSld>
+  <p:clrMapOvr>
+    <a:masterClrMapping/>
+  </p:clrMapOvr>
+</p:sld>
+</file>
+
+<file path=ppt/slides/slide4.xml><?xml version="1.0" encoding="utf-8"?>
+<p:sld xmlns:a="http://schemas.openxmlformats.org/drawingml/2006/main" xmlns:r="http://schemas.openxmlformats.org/officeDocument/2006/relationships" xmlns:p="http://schemas.openxmlformats.org/presentationml/2006/main">
+  <p:cSld>
+    <p:spTree>
+      <p:nvGrpSpPr>
+        <p:cNvPr id="1" name=""/>
+        <p:cNvGrpSpPr/>
+        <p:nvPr/>
+      </p:nvGrpSpPr>
+      <p:grpSpPr>
+        <a:xfrm>
+          <a:off x="0" y="0"/>
+          <a:ext cx="0" cy="0"/>
+          <a:chOff x="0" y="0"/>
+          <a:chExt cx="0" cy="0"/>
+        </a:xfrm>
+      </p:grpSpPr>
+      <p:sp>
+        <p:nvSpPr>
+          <p:cNvPr id="2" name="Title 1">
+            <a:extLst>
+              <a:ext uri="{FF2B5EF4-FFF2-40B4-BE49-F238E27FC236}">
+                <a16:creationId xmlns:a16="http://schemas.microsoft.com/office/drawing/2014/main" id="{3E303F73-2AEE-BBCB-07CF-733C870B59F8}"/>
+              </a:ext>
+            </a:extLst>
+          </p:cNvPr>
+          <p:cNvSpPr>
+            <a:spLocks noGrp="1"/>
+          </p:cNvSpPr>
+          <p:nvPr>
+            <p:ph type="title"/>
+          </p:nvPr>
+        </p:nvSpPr>
+        <p:spPr>
+          <a:xfrm>
+            <a:off x="520117" y="198452"/>
+            <a:ext cx="10833683" cy="649943"/>
+          </a:xfrm>
+        </p:spPr>
+        <p:txBody>
+          <a:bodyPr>
+            <a:normAutofit/>
+          </a:bodyPr>
+          <a:lstStyle/>
+          <a:p>
+            <a:r>
+              <a:rPr lang="en-US" sz="3600" b="1" dirty="0">
+                <a:latin typeface="+mn-lt"/>
+              </a:rPr>
+              <a:t>Sampling protocol:</a:t>
+            </a:r>
+          </a:p>
+        </p:txBody>
+      </p:sp>
+      <p:sp>
+        <p:nvSpPr>
+          <p:cNvPr id="4" name="TextBox 3">
+            <a:extLst>
+              <a:ext uri="{FF2B5EF4-FFF2-40B4-BE49-F238E27FC236}">
+                <a16:creationId xmlns:a16="http://schemas.microsoft.com/office/drawing/2014/main" id="{AE02FDB3-3FF4-C17A-DB4F-D0B4D299B4EC}"/>
+              </a:ext>
+            </a:extLst>
+          </p:cNvPr>
+          <p:cNvSpPr txBox="1"/>
+          <p:nvPr/>
+        </p:nvSpPr>
+        <p:spPr>
+          <a:xfrm>
+            <a:off x="520117" y="930418"/>
+            <a:ext cx="10939793" cy="1561005"/>
+          </a:xfrm>
+          <a:prstGeom prst="rect">
+            <a:avLst/>
+          </a:prstGeom>
+          <a:noFill/>
+        </p:spPr>
+        <p:txBody>
+          <a:bodyPr wrap="square" rtlCol="0">
+            <a:spAutoFit/>
+          </a:bodyPr>
+          <a:lstStyle/>
+          <a:p>
+            <a:pPr marL="342900" marR="0" lvl="0" indent="-342900">
+              <a:lnSpc>
+                <a:spcPct val="107000"/>
+              </a:lnSpc>
+              <a:spcBef>
+                <a:spcPts val="0"/>
+              </a:spcBef>
+              <a:spcAft>
+                <a:spcPts val="0"/>
+              </a:spcAft>
+              <a:buFont typeface="Symbol" panose="05050102010706020507" pitchFamily="18" charset="2"/>
+              <a:buChar char=""/>
+            </a:pPr>
+            <a:r>
+              <a:rPr lang="en-US" sz="1800" dirty="0">
+                <a:effectLst/>
+                <a:latin typeface="Calibri" panose="020F0502020204030204" pitchFamily="34" charset="0"/>
+                <a:ea typeface="Calibri" panose="020F0502020204030204" pitchFamily="34" charset="0"/>
+                <a:cs typeface="Times New Roman" panose="02020603050405020304" pitchFamily="18" charset="0"/>
+              </a:rPr>
+              <a:t>Summary of study </a:t>
+            </a:r>
+            <a:r>
+              <a:rPr lang="en-US" sz="1800" b="1" dirty="0">
+                <a:effectLst/>
+                <a:latin typeface="Calibri" panose="020F0502020204030204" pitchFamily="34" charset="0"/>
+                <a:ea typeface="Calibri" panose="020F0502020204030204" pitchFamily="34" charset="0"/>
+                <a:cs typeface="Times New Roman" panose="02020603050405020304" pitchFamily="18" charset="0"/>
+              </a:rPr>
+              <a:t>goals</a:t>
+            </a:r>
+            <a:r>
+              <a:rPr lang="en-US" sz="1800" dirty="0">
+                <a:effectLst/>
+                <a:latin typeface="Calibri" panose="020F0502020204030204" pitchFamily="34" charset="0"/>
+                <a:ea typeface="Calibri" panose="020F0502020204030204" pitchFamily="34" charset="0"/>
+                <a:cs typeface="Times New Roman" panose="02020603050405020304" pitchFamily="18" charset="0"/>
+              </a:rPr>
+              <a:t>.</a:t>
+            </a:r>
+          </a:p>
+          <a:p>
+            <a:pPr marL="342900" marR="0" lvl="0" indent="-342900">
+              <a:lnSpc>
+                <a:spcPct val="107000"/>
+              </a:lnSpc>
+              <a:spcBef>
+                <a:spcPts val="0"/>
+              </a:spcBef>
+              <a:spcAft>
+                <a:spcPts val="0"/>
+              </a:spcAft>
+              <a:buFont typeface="Symbol" panose="05050102010706020507" pitchFamily="18" charset="2"/>
+              <a:buChar char=""/>
+            </a:pPr>
+            <a:r>
+              <a:rPr lang="en-US" sz="1800" b="1" dirty="0">
+                <a:effectLst/>
+                <a:latin typeface="Calibri" panose="020F0502020204030204" pitchFamily="34" charset="0"/>
+                <a:ea typeface="Calibri" panose="020F0502020204030204" pitchFamily="34" charset="0"/>
+                <a:cs typeface="Times New Roman" panose="02020603050405020304" pitchFamily="18" charset="0"/>
+              </a:rPr>
+              <a:t>Experimental</a:t>
+            </a:r>
+            <a:r>
+              <a:rPr lang="en-US" sz="1800" dirty="0">
+                <a:effectLst/>
+                <a:latin typeface="Calibri" panose="020F0502020204030204" pitchFamily="34" charset="0"/>
+                <a:ea typeface="Calibri" panose="020F0502020204030204" pitchFamily="34" charset="0"/>
+                <a:cs typeface="Times New Roman" panose="02020603050405020304" pitchFamily="18" charset="0"/>
+              </a:rPr>
+              <a:t> or </a:t>
+            </a:r>
+            <a:r>
+              <a:rPr lang="en-US" sz="1800" b="1" dirty="0">
+                <a:effectLst/>
+                <a:latin typeface="Calibri" panose="020F0502020204030204" pitchFamily="34" charset="0"/>
+                <a:ea typeface="Calibri" panose="020F0502020204030204" pitchFamily="34" charset="0"/>
+                <a:cs typeface="Times New Roman" panose="02020603050405020304" pitchFamily="18" charset="0"/>
+              </a:rPr>
+              <a:t>sampling design</a:t>
+            </a:r>
+            <a:r>
+              <a:rPr lang="en-US" sz="1800" dirty="0">
+                <a:effectLst/>
+                <a:latin typeface="Calibri" panose="020F0502020204030204" pitchFamily="34" charset="0"/>
+                <a:ea typeface="Calibri" panose="020F0502020204030204" pitchFamily="34" charset="0"/>
+                <a:cs typeface="Times New Roman" panose="02020603050405020304" pitchFamily="18" charset="0"/>
+              </a:rPr>
+              <a:t> (e.g. sampling locations, variables to measure, fishing gear, …).</a:t>
+            </a:r>
+          </a:p>
+          <a:p>
+            <a:pPr marL="342900" marR="0" lvl="0" indent="-342900">
+              <a:lnSpc>
+                <a:spcPct val="107000"/>
+              </a:lnSpc>
+              <a:spcBef>
+                <a:spcPts val="0"/>
+              </a:spcBef>
+              <a:spcAft>
+                <a:spcPts val="0"/>
+              </a:spcAft>
+              <a:buFont typeface="Symbol" panose="05050102010706020507" pitchFamily="18" charset="2"/>
+              <a:buChar char=""/>
+            </a:pPr>
+            <a:r>
+              <a:rPr lang="en-US" sz="1800" dirty="0">
+                <a:effectLst/>
+                <a:latin typeface="Calibri" panose="020F0502020204030204" pitchFamily="34" charset="0"/>
+                <a:ea typeface="Calibri" panose="020F0502020204030204" pitchFamily="34" charset="0"/>
+                <a:cs typeface="Times New Roman" panose="02020603050405020304" pitchFamily="18" charset="0"/>
+              </a:rPr>
+              <a:t>Data </a:t>
+            </a:r>
+            <a:r>
+              <a:rPr lang="en-US" sz="1800" b="1" dirty="0">
+                <a:effectLst/>
+                <a:latin typeface="Calibri" panose="020F0502020204030204" pitchFamily="34" charset="0"/>
+                <a:ea typeface="Calibri" panose="020F0502020204030204" pitchFamily="34" charset="0"/>
+                <a:cs typeface="Times New Roman" panose="02020603050405020304" pitchFamily="18" charset="0"/>
+              </a:rPr>
+              <a:t>field descriptions</a:t>
+            </a:r>
+            <a:r>
+              <a:rPr lang="en-US" sz="1800" dirty="0">
+                <a:effectLst/>
+                <a:latin typeface="Calibri" panose="020F0502020204030204" pitchFamily="34" charset="0"/>
+                <a:ea typeface="Calibri" panose="020F0502020204030204" pitchFamily="34" charset="0"/>
+                <a:cs typeface="Times New Roman" panose="02020603050405020304" pitchFamily="18" charset="0"/>
+              </a:rPr>
+              <a:t> and </a:t>
+            </a:r>
+            <a:r>
+              <a:rPr lang="en-US" sz="1800" b="1" dirty="0">
+                <a:effectLst/>
+                <a:latin typeface="Calibri" panose="020F0502020204030204" pitchFamily="34" charset="0"/>
+                <a:ea typeface="Calibri" panose="020F0502020204030204" pitchFamily="34" charset="0"/>
+                <a:cs typeface="Times New Roman" panose="02020603050405020304" pitchFamily="18" charset="0"/>
+              </a:rPr>
+              <a:t>code definitions</a:t>
+            </a:r>
+            <a:r>
+              <a:rPr lang="en-US" sz="1800" dirty="0">
+                <a:effectLst/>
+                <a:latin typeface="Calibri" panose="020F0502020204030204" pitchFamily="34" charset="0"/>
+                <a:ea typeface="Calibri" panose="020F0502020204030204" pitchFamily="34" charset="0"/>
+                <a:cs typeface="Times New Roman" panose="02020603050405020304" pitchFamily="18" charset="0"/>
+              </a:rPr>
+              <a:t> (e.g. hepato-</a:t>
+            </a:r>
+            <a:r>
+              <a:rPr lang="en-US" sz="1800" dirty="0" err="1">
+                <a:effectLst/>
+                <a:latin typeface="Calibri" panose="020F0502020204030204" pitchFamily="34" charset="0"/>
+                <a:ea typeface="Calibri" panose="020F0502020204030204" pitchFamily="34" charset="0"/>
+                <a:cs typeface="Times New Roman" panose="02020603050405020304" pitchFamily="18" charset="0"/>
+              </a:rPr>
+              <a:t>colour</a:t>
+            </a:r>
+            <a:r>
+              <a:rPr lang="en-US" sz="1800" dirty="0">
+                <a:effectLst/>
+                <a:latin typeface="Calibri" panose="020F0502020204030204" pitchFamily="34" charset="0"/>
+                <a:ea typeface="Calibri" panose="020F0502020204030204" pitchFamily="34" charset="0"/>
+                <a:cs typeface="Times New Roman" panose="02020603050405020304" pitchFamily="18" charset="0"/>
+              </a:rPr>
+              <a:t> codes).</a:t>
+            </a:r>
+          </a:p>
+          <a:p>
+            <a:pPr marL="342900" marR="0" lvl="0" indent="-342900">
+              <a:lnSpc>
+                <a:spcPct val="107000"/>
+              </a:lnSpc>
+              <a:spcBef>
+                <a:spcPts val="0"/>
+              </a:spcBef>
+              <a:spcAft>
+                <a:spcPts val="0"/>
+              </a:spcAft>
+              <a:buFont typeface="Symbol" panose="05050102010706020507" pitchFamily="18" charset="2"/>
+              <a:buChar char=""/>
+            </a:pPr>
+            <a:r>
+              <a:rPr lang="en-US" sz="1800" b="1" dirty="0">
+                <a:effectLst/>
+                <a:latin typeface="Calibri" panose="020F0502020204030204" pitchFamily="34" charset="0"/>
+                <a:ea typeface="Calibri" panose="020F0502020204030204" pitchFamily="34" charset="0"/>
+                <a:cs typeface="Times New Roman" panose="02020603050405020304" pitchFamily="18" charset="0"/>
+              </a:rPr>
+              <a:t>Instrument list</a:t>
+            </a:r>
+            <a:r>
+              <a:rPr lang="en-US" sz="1800" dirty="0">
+                <a:effectLst/>
+                <a:latin typeface="Calibri" panose="020F0502020204030204" pitchFamily="34" charset="0"/>
+                <a:ea typeface="Calibri" panose="020F0502020204030204" pitchFamily="34" charset="0"/>
+                <a:cs typeface="Times New Roman" panose="02020603050405020304" pitchFamily="18" charset="0"/>
+              </a:rPr>
+              <a:t> and settings (e.g. La*b* setting on colorimeter).</a:t>
+            </a:r>
+          </a:p>
+          <a:p>
+            <a:pPr marL="342900" marR="0" lvl="0" indent="-342900">
+              <a:lnSpc>
+                <a:spcPct val="107000"/>
+              </a:lnSpc>
+              <a:spcBef>
+                <a:spcPts val="0"/>
+              </a:spcBef>
+              <a:spcAft>
+                <a:spcPts val="800"/>
+              </a:spcAft>
+              <a:buFont typeface="Symbol" panose="05050102010706020507" pitchFamily="18" charset="2"/>
+              <a:buChar char=""/>
+            </a:pPr>
+            <a:r>
+              <a:rPr lang="en-US" sz="1800" b="1" dirty="0">
+                <a:effectLst/>
+                <a:latin typeface="Calibri" panose="020F0502020204030204" pitchFamily="34" charset="0"/>
+                <a:ea typeface="Calibri" panose="020F0502020204030204" pitchFamily="34" charset="0"/>
+                <a:cs typeface="Times New Roman" panose="02020603050405020304" pitchFamily="18" charset="0"/>
+              </a:rPr>
+              <a:t>References</a:t>
+            </a:r>
+            <a:r>
+              <a:rPr lang="en-US" sz="1800" dirty="0">
+                <a:effectLst/>
+                <a:latin typeface="Calibri" panose="020F0502020204030204" pitchFamily="34" charset="0"/>
+                <a:ea typeface="Calibri" panose="020F0502020204030204" pitchFamily="34" charset="0"/>
+                <a:cs typeface="Times New Roman" panose="02020603050405020304" pitchFamily="18" charset="0"/>
+              </a:rPr>
+              <a:t> for background studies, e.g. previous reports or studies using the sampling protocol.</a:t>
+            </a:r>
+          </a:p>
+        </p:txBody>
+      </p:sp>
+    </p:spTree>
+    <p:extLst>
+      <p:ext uri="{BB962C8B-B14F-4D97-AF65-F5344CB8AC3E}">
+        <p14:creationId xmlns:p14="http://schemas.microsoft.com/office/powerpoint/2010/main" val="3730213873"/>
+      </p:ext>
+    </p:extLst>
+  </p:cSld>
+  <p:clrMapOvr>
+    <a:masterClrMapping/>
+  </p:clrMapOvr>
+</p:sld>
+</file>
+
+<file path=ppt/slides/slide5.xml><?xml version="1.0" encoding="utf-8"?>
+<p:sld xmlns:a="http://schemas.openxmlformats.org/drawingml/2006/main" xmlns:r="http://schemas.openxmlformats.org/officeDocument/2006/relationships" xmlns:p="http://schemas.openxmlformats.org/presentationml/2006/main">
+  <p:cSld>
+    <p:spTree>
+      <p:nvGrpSpPr>
+        <p:cNvPr id="1" name=""/>
+        <p:cNvGrpSpPr/>
+        <p:nvPr/>
+      </p:nvGrpSpPr>
+      <p:grpSpPr>
+        <a:xfrm>
+          <a:off x="0" y="0"/>
+          <a:ext cx="0" cy="0"/>
+          <a:chOff x="0" y="0"/>
+          <a:chExt cx="0" cy="0"/>
+        </a:xfrm>
+      </p:grpSpPr>
+      <p:sp>
+        <p:nvSpPr>
+          <p:cNvPr id="2" name="Title 1">
+            <a:extLst>
+              <a:ext uri="{FF2B5EF4-FFF2-40B4-BE49-F238E27FC236}">
+                <a16:creationId xmlns:a16="http://schemas.microsoft.com/office/drawing/2014/main" id="{3E303F73-2AEE-BBCB-07CF-733C870B59F8}"/>
+              </a:ext>
+            </a:extLst>
+          </p:cNvPr>
+          <p:cNvSpPr>
+            <a:spLocks noGrp="1"/>
+          </p:cNvSpPr>
+          <p:nvPr>
+            <p:ph type="title"/>
+          </p:nvPr>
+        </p:nvSpPr>
+        <p:spPr>
+          <a:xfrm>
+            <a:off x="520117" y="198452"/>
+            <a:ext cx="10833683" cy="649943"/>
+          </a:xfrm>
+        </p:spPr>
+        <p:txBody>
+          <a:bodyPr>
+            <a:normAutofit/>
+          </a:bodyPr>
+          <a:lstStyle/>
+          <a:p>
+            <a:r>
+              <a:rPr lang="en-US" sz="3600" b="1" dirty="0">
+                <a:latin typeface="+mn-lt"/>
+              </a:rPr>
+              <a:t>Field observations:</a:t>
+            </a:r>
+          </a:p>
+        </p:txBody>
+      </p:sp>
+      <p:sp>
+        <p:nvSpPr>
+          <p:cNvPr id="4" name="TextBox 3">
+            <a:extLst>
+              <a:ext uri="{FF2B5EF4-FFF2-40B4-BE49-F238E27FC236}">
+                <a16:creationId xmlns:a16="http://schemas.microsoft.com/office/drawing/2014/main" id="{AE02FDB3-3FF4-C17A-DB4F-D0B4D299B4EC}"/>
+              </a:ext>
+            </a:extLst>
+          </p:cNvPr>
+          <p:cNvSpPr txBox="1"/>
+          <p:nvPr/>
+        </p:nvSpPr>
+        <p:spPr>
+          <a:xfrm>
+            <a:off x="520117" y="930418"/>
+            <a:ext cx="10939793" cy="1857368"/>
+          </a:xfrm>
+          <a:prstGeom prst="rect">
+            <a:avLst/>
+          </a:prstGeom>
+          <a:noFill/>
+        </p:spPr>
+        <p:txBody>
+          <a:bodyPr wrap="square" rtlCol="0">
+            <a:spAutoFit/>
+          </a:bodyPr>
+          <a:lstStyle/>
+          <a:p>
+            <a:pPr marL="342900" marR="0" lvl="0" indent="-342900">
+              <a:lnSpc>
+                <a:spcPct val="107000"/>
+              </a:lnSpc>
+              <a:spcBef>
+                <a:spcPts val="0"/>
+              </a:spcBef>
+              <a:spcAft>
+                <a:spcPts val="0"/>
+              </a:spcAft>
+              <a:buFont typeface="Symbol" panose="05050102010706020507" pitchFamily="18" charset="2"/>
+              <a:buChar char=""/>
+            </a:pPr>
+            <a:r>
+              <a:rPr lang="en-US" sz="1800" dirty="0">
+                <a:effectLst/>
+                <a:latin typeface="Calibri" panose="020F0502020204030204" pitchFamily="34" charset="0"/>
+                <a:ea typeface="Calibri" panose="020F0502020204030204" pitchFamily="34" charset="0"/>
+                <a:cs typeface="Times New Roman" panose="02020603050405020304" pitchFamily="18" charset="0"/>
+              </a:rPr>
+              <a:t>Actual </a:t>
+            </a:r>
+            <a:r>
+              <a:rPr lang="en-US" sz="1800" b="1" dirty="0">
+                <a:effectLst/>
+                <a:latin typeface="Calibri" panose="020F0502020204030204" pitchFamily="34" charset="0"/>
+                <a:ea typeface="Calibri" panose="020F0502020204030204" pitchFamily="34" charset="0"/>
+                <a:cs typeface="Times New Roman" panose="02020603050405020304" pitchFamily="18" charset="0"/>
+              </a:rPr>
+              <a:t>sampling locations</a:t>
+            </a:r>
+            <a:r>
+              <a:rPr lang="en-US" sz="1800" dirty="0">
+                <a:effectLst/>
+                <a:latin typeface="Calibri" panose="020F0502020204030204" pitchFamily="34" charset="0"/>
+                <a:ea typeface="Calibri" panose="020F0502020204030204" pitchFamily="34" charset="0"/>
+                <a:cs typeface="Times New Roman" panose="02020603050405020304" pitchFamily="18" charset="0"/>
+              </a:rPr>
+              <a:t>, </a:t>
+            </a:r>
+            <a:r>
+              <a:rPr lang="en-US" sz="1800" b="1" dirty="0">
+                <a:effectLst/>
+                <a:latin typeface="Calibri" panose="020F0502020204030204" pitchFamily="34" charset="0"/>
+                <a:ea typeface="Calibri" panose="020F0502020204030204" pitchFamily="34" charset="0"/>
+                <a:cs typeface="Times New Roman" panose="02020603050405020304" pitchFamily="18" charset="0"/>
+              </a:rPr>
+              <a:t>fishing gear</a:t>
+            </a:r>
+            <a:r>
+              <a:rPr lang="en-US" sz="1800" dirty="0">
+                <a:effectLst/>
+                <a:latin typeface="Calibri" panose="020F0502020204030204" pitchFamily="34" charset="0"/>
+                <a:ea typeface="Calibri" panose="020F0502020204030204" pitchFamily="34" charset="0"/>
+                <a:cs typeface="Times New Roman" panose="02020603050405020304" pitchFamily="18" charset="0"/>
+              </a:rPr>
+              <a:t> and </a:t>
+            </a:r>
+            <a:r>
+              <a:rPr lang="en-US" sz="1800" b="1" dirty="0">
+                <a:effectLst/>
+                <a:latin typeface="Calibri" panose="020F0502020204030204" pitchFamily="34" charset="0"/>
+                <a:ea typeface="Calibri" panose="020F0502020204030204" pitchFamily="34" charset="0"/>
+                <a:cs typeface="Times New Roman" panose="02020603050405020304" pitchFamily="18" charset="0"/>
+              </a:rPr>
+              <a:t>vessel</a:t>
+            </a:r>
+            <a:r>
+              <a:rPr lang="en-US" sz="1800" dirty="0">
+                <a:effectLst/>
+                <a:latin typeface="Calibri" panose="020F0502020204030204" pitchFamily="34" charset="0"/>
+                <a:ea typeface="Calibri" panose="020F0502020204030204" pitchFamily="34" charset="0"/>
+                <a:cs typeface="Times New Roman" panose="02020603050405020304" pitchFamily="18" charset="0"/>
+              </a:rPr>
+              <a:t>. Include any changes to the original sampling protocol and explain why and how they were changed.</a:t>
+            </a:r>
+          </a:p>
+          <a:p>
+            <a:pPr marL="342900" marR="0" lvl="0" indent="-342900">
+              <a:lnSpc>
+                <a:spcPct val="107000"/>
+              </a:lnSpc>
+              <a:spcBef>
+                <a:spcPts val="0"/>
+              </a:spcBef>
+              <a:spcAft>
+                <a:spcPts val="0"/>
+              </a:spcAft>
+              <a:buFont typeface="Symbol" panose="05050102010706020507" pitchFamily="18" charset="2"/>
+              <a:buChar char=""/>
+            </a:pPr>
+            <a:r>
+              <a:rPr lang="en-US" sz="1800" dirty="0">
+                <a:effectLst/>
+                <a:latin typeface="Calibri" panose="020F0502020204030204" pitchFamily="34" charset="0"/>
+                <a:ea typeface="Calibri" panose="020F0502020204030204" pitchFamily="34" charset="0"/>
+                <a:cs typeface="Times New Roman" panose="02020603050405020304" pitchFamily="18" charset="0"/>
+              </a:rPr>
+              <a:t>List of field </a:t>
+            </a:r>
+            <a:r>
+              <a:rPr lang="en-US" sz="1800" b="1" dirty="0">
+                <a:effectLst/>
+                <a:latin typeface="Calibri" panose="020F0502020204030204" pitchFamily="34" charset="0"/>
+                <a:ea typeface="Calibri" panose="020F0502020204030204" pitchFamily="34" charset="0"/>
+                <a:cs typeface="Times New Roman" panose="02020603050405020304" pitchFamily="18" charset="0"/>
+              </a:rPr>
+              <a:t>technicians</a:t>
+            </a:r>
+            <a:r>
+              <a:rPr lang="en-US" sz="1800" dirty="0">
+                <a:effectLst/>
+                <a:latin typeface="Calibri" panose="020F0502020204030204" pitchFamily="34" charset="0"/>
+                <a:ea typeface="Calibri" panose="020F0502020204030204" pitchFamily="34" charset="0"/>
+                <a:cs typeface="Times New Roman" panose="02020603050405020304" pitchFamily="18" charset="0"/>
+              </a:rPr>
+              <a:t> and brief description of </a:t>
+            </a:r>
+            <a:r>
+              <a:rPr lang="en-US" sz="1800" b="1" dirty="0">
+                <a:effectLst/>
+                <a:latin typeface="Calibri" panose="020F0502020204030204" pitchFamily="34" charset="0"/>
+                <a:ea typeface="Calibri" panose="020F0502020204030204" pitchFamily="34" charset="0"/>
+                <a:cs typeface="Times New Roman" panose="02020603050405020304" pitchFamily="18" charset="0"/>
+              </a:rPr>
+              <a:t>duties</a:t>
+            </a:r>
+            <a:r>
+              <a:rPr lang="en-US" sz="1800" dirty="0">
+                <a:effectLst/>
+                <a:latin typeface="Calibri" panose="020F0502020204030204" pitchFamily="34" charset="0"/>
+                <a:ea typeface="Calibri" panose="020F0502020204030204" pitchFamily="34" charset="0"/>
+                <a:cs typeface="Times New Roman" panose="02020603050405020304" pitchFamily="18" charset="0"/>
+              </a:rPr>
+              <a:t>.</a:t>
+            </a:r>
+          </a:p>
+          <a:p>
+            <a:pPr marL="342900" marR="0" lvl="0" indent="-342900">
+              <a:lnSpc>
+                <a:spcPct val="107000"/>
+              </a:lnSpc>
+              <a:spcBef>
+                <a:spcPts val="0"/>
+              </a:spcBef>
+              <a:spcAft>
+                <a:spcPts val="0"/>
+              </a:spcAft>
+              <a:buFont typeface="Symbol" panose="05050102010706020507" pitchFamily="18" charset="2"/>
+              <a:buChar char=""/>
+            </a:pPr>
+            <a:r>
+              <a:rPr lang="en-US" sz="1800" b="1" dirty="0">
+                <a:effectLst/>
+                <a:latin typeface="Calibri" panose="020F0502020204030204" pitchFamily="34" charset="0"/>
+                <a:ea typeface="Calibri" panose="020F0502020204030204" pitchFamily="34" charset="0"/>
+                <a:cs typeface="Times New Roman" panose="02020603050405020304" pitchFamily="18" charset="0"/>
+              </a:rPr>
+              <a:t>Issues</a:t>
+            </a:r>
+            <a:r>
+              <a:rPr lang="en-US" sz="1800" dirty="0">
+                <a:effectLst/>
+                <a:latin typeface="Calibri" panose="020F0502020204030204" pitchFamily="34" charset="0"/>
+                <a:ea typeface="Calibri" panose="020F0502020204030204" pitchFamily="34" charset="0"/>
+                <a:cs typeface="Times New Roman" panose="02020603050405020304" pitchFamily="18" charset="0"/>
+              </a:rPr>
+              <a:t> encountered which may have affected the experimental design or the data.</a:t>
+            </a:r>
+          </a:p>
+          <a:p>
+            <a:pPr marL="342900" marR="0" lvl="0" indent="-342900">
+              <a:lnSpc>
+                <a:spcPct val="107000"/>
+              </a:lnSpc>
+              <a:spcBef>
+                <a:spcPts val="0"/>
+              </a:spcBef>
+              <a:spcAft>
+                <a:spcPts val="0"/>
+              </a:spcAft>
+              <a:buFont typeface="Symbol" panose="05050102010706020507" pitchFamily="18" charset="2"/>
+              <a:buChar char=""/>
+            </a:pPr>
+            <a:r>
+              <a:rPr lang="en-US" sz="1800" b="1" dirty="0">
+                <a:effectLst/>
+                <a:latin typeface="Calibri" panose="020F0502020204030204" pitchFamily="34" charset="0"/>
+                <a:ea typeface="Calibri" panose="020F0502020204030204" pitchFamily="34" charset="0"/>
+                <a:cs typeface="Times New Roman" panose="02020603050405020304" pitchFamily="18" charset="0"/>
+              </a:rPr>
+              <a:t>Event times</a:t>
+            </a:r>
+            <a:r>
+              <a:rPr lang="en-US" sz="1800" dirty="0">
+                <a:effectLst/>
+                <a:latin typeface="Calibri" panose="020F0502020204030204" pitchFamily="34" charset="0"/>
+                <a:ea typeface="Calibri" panose="020F0502020204030204" pitchFamily="34" charset="0"/>
+                <a:cs typeface="Times New Roman" panose="02020603050405020304" pitchFamily="18" charset="0"/>
+              </a:rPr>
+              <a:t> (e.g. trap setting and retrieval times).</a:t>
+            </a:r>
+          </a:p>
+          <a:p>
+            <a:pPr marL="342900" marR="0" lvl="0" indent="-342900">
+              <a:lnSpc>
+                <a:spcPct val="107000"/>
+              </a:lnSpc>
+              <a:spcBef>
+                <a:spcPts val="0"/>
+              </a:spcBef>
+              <a:spcAft>
+                <a:spcPts val="800"/>
+              </a:spcAft>
+              <a:buFont typeface="Symbol" panose="05050102010706020507" pitchFamily="18" charset="2"/>
+              <a:buChar char=""/>
+            </a:pPr>
+            <a:r>
+              <a:rPr lang="en-US" sz="1800" dirty="0">
+                <a:effectLst/>
+                <a:latin typeface="Calibri" panose="020F0502020204030204" pitchFamily="34" charset="0"/>
+                <a:ea typeface="Calibri" panose="020F0502020204030204" pitchFamily="34" charset="0"/>
+                <a:cs typeface="Times New Roman" panose="02020603050405020304" pitchFamily="18" charset="0"/>
+              </a:rPr>
+              <a:t>Some </a:t>
+            </a:r>
+            <a:r>
+              <a:rPr lang="en-US" sz="1800" b="1" dirty="0">
+                <a:effectLst/>
+                <a:latin typeface="Calibri" panose="020F0502020204030204" pitchFamily="34" charset="0"/>
+                <a:ea typeface="Calibri" panose="020F0502020204030204" pitchFamily="34" charset="0"/>
+                <a:cs typeface="Times New Roman" panose="02020603050405020304" pitchFamily="18" charset="0"/>
+              </a:rPr>
+              <a:t>photos</a:t>
+            </a:r>
+            <a:r>
+              <a:rPr lang="en-US" sz="1800" dirty="0">
+                <a:effectLst/>
+                <a:latin typeface="Calibri" panose="020F0502020204030204" pitchFamily="34" charset="0"/>
+                <a:ea typeface="Calibri" panose="020F0502020204030204" pitchFamily="34" charset="0"/>
+                <a:cs typeface="Times New Roman" panose="02020603050405020304" pitchFamily="18" charset="0"/>
+              </a:rPr>
+              <a:t> of gear, activities, measurements, and specimens.</a:t>
+            </a:r>
+          </a:p>
+        </p:txBody>
+      </p:sp>
+    </p:spTree>
+    <p:extLst>
+      <p:ext uri="{BB962C8B-B14F-4D97-AF65-F5344CB8AC3E}">
+        <p14:creationId xmlns:p14="http://schemas.microsoft.com/office/powerpoint/2010/main" val="1782191636"/>
+      </p:ext>
+    </p:extLst>
+  </p:cSld>
+  <p:clrMapOvr>
+    <a:masterClrMapping/>
+  </p:clrMapOvr>
+</p:sld>
+</file>
+
+<file path=ppt/slides/slide6.xml><?xml version="1.0" encoding="utf-8"?>
+<p:sld xmlns:a="http://schemas.openxmlformats.org/drawingml/2006/main" xmlns:r="http://schemas.openxmlformats.org/officeDocument/2006/relationships" xmlns:p="http://schemas.openxmlformats.org/presentationml/2006/main">
+  <p:cSld>
+    <p:spTree>
+      <p:nvGrpSpPr>
+        <p:cNvPr id="1" name=""/>
+        <p:cNvGrpSpPr/>
+        <p:nvPr/>
+      </p:nvGrpSpPr>
+      <p:grpSpPr>
+        <a:xfrm>
+          <a:off x="0" y="0"/>
+          <a:ext cx="0" cy="0"/>
+          <a:chOff x="0" y="0"/>
+          <a:chExt cx="0" cy="0"/>
+        </a:xfrm>
+      </p:grpSpPr>
+      <p:sp>
+        <p:nvSpPr>
+          <p:cNvPr id="2" name="Title 1">
+            <a:extLst>
+              <a:ext uri="{FF2B5EF4-FFF2-40B4-BE49-F238E27FC236}">
+                <a16:creationId xmlns:a16="http://schemas.microsoft.com/office/drawing/2014/main" id="{3E303F73-2AEE-BBCB-07CF-733C870B59F8}"/>
+              </a:ext>
+            </a:extLst>
+          </p:cNvPr>
+          <p:cNvSpPr>
+            <a:spLocks noGrp="1"/>
+          </p:cNvSpPr>
+          <p:nvPr>
+            <p:ph type="title"/>
+          </p:nvPr>
+        </p:nvSpPr>
+        <p:spPr>
+          <a:xfrm>
+            <a:off x="520117" y="198452"/>
+            <a:ext cx="10833683" cy="649943"/>
+          </a:xfrm>
+        </p:spPr>
+        <p:txBody>
+          <a:bodyPr>
+            <a:normAutofit/>
+          </a:bodyPr>
+          <a:lstStyle/>
+          <a:p>
+            <a:r>
+              <a:rPr lang="en-US" sz="3600" b="1" dirty="0">
+                <a:latin typeface="+mn-lt"/>
+              </a:rPr>
+              <a:t>Debriefing:</a:t>
+            </a:r>
+          </a:p>
+        </p:txBody>
+      </p:sp>
+      <p:sp>
+        <p:nvSpPr>
+          <p:cNvPr id="4" name="TextBox 3">
+            <a:extLst>
+              <a:ext uri="{FF2B5EF4-FFF2-40B4-BE49-F238E27FC236}">
+                <a16:creationId xmlns:a16="http://schemas.microsoft.com/office/drawing/2014/main" id="{AE02FDB3-3FF4-C17A-DB4F-D0B4D299B4EC}"/>
+              </a:ext>
+            </a:extLst>
+          </p:cNvPr>
+          <p:cNvSpPr txBox="1"/>
+          <p:nvPr/>
+        </p:nvSpPr>
+        <p:spPr>
+          <a:xfrm>
+            <a:off x="520117" y="930418"/>
+            <a:ext cx="10939793" cy="2746457"/>
+          </a:xfrm>
+          <a:prstGeom prst="rect">
+            <a:avLst/>
+          </a:prstGeom>
+          <a:noFill/>
+        </p:spPr>
+        <p:txBody>
+          <a:bodyPr wrap="square" rtlCol="0">
+            <a:spAutoFit/>
+          </a:bodyPr>
+          <a:lstStyle/>
+          <a:p>
+            <a:pPr marL="342900" marR="0" lvl="0" indent="-342900">
+              <a:lnSpc>
+                <a:spcPct val="107000"/>
+              </a:lnSpc>
+              <a:spcBef>
+                <a:spcPts val="0"/>
+              </a:spcBef>
+              <a:spcAft>
+                <a:spcPts val="0"/>
+              </a:spcAft>
+              <a:buFont typeface="Symbol" panose="05050102010706020507" pitchFamily="18" charset="2"/>
+              <a:buChar char=""/>
+            </a:pPr>
+            <a:r>
+              <a:rPr lang="en-US" b="1" dirty="0">
+                <a:effectLst/>
+                <a:latin typeface="Calibri" panose="020F0502020204030204" pitchFamily="34" charset="0"/>
+                <a:ea typeface="Calibri" panose="020F0502020204030204" pitchFamily="34" charset="0"/>
+                <a:cs typeface="Times New Roman" panose="02020603050405020304" pitchFamily="18" charset="0"/>
+              </a:rPr>
+              <a:t>Review </a:t>
+            </a:r>
+            <a:r>
+              <a:rPr lang="en-US" dirty="0">
+                <a:effectLst/>
+                <a:latin typeface="Calibri" panose="020F0502020204030204" pitchFamily="34" charset="0"/>
+                <a:ea typeface="Calibri" panose="020F0502020204030204" pitchFamily="34" charset="0"/>
+                <a:cs typeface="Times New Roman" panose="02020603050405020304" pitchFamily="18" charset="0"/>
+              </a:rPr>
+              <a:t>field </a:t>
+            </a:r>
+            <a:r>
+              <a:rPr lang="en-US" b="1" dirty="0">
+                <a:effectLst/>
+                <a:latin typeface="Calibri" panose="020F0502020204030204" pitchFamily="34" charset="0"/>
+                <a:ea typeface="Calibri" panose="020F0502020204030204" pitchFamily="34" charset="0"/>
+                <a:cs typeface="Times New Roman" panose="02020603050405020304" pitchFamily="18" charset="0"/>
+              </a:rPr>
+              <a:t>data:</a:t>
+            </a:r>
+            <a:endParaRPr lang="en-US" dirty="0">
+              <a:effectLst/>
+              <a:latin typeface="Calibri" panose="020F0502020204030204" pitchFamily="34" charset="0"/>
+              <a:ea typeface="Calibri" panose="020F0502020204030204" pitchFamily="34" charset="0"/>
+              <a:cs typeface="Times New Roman" panose="02020603050405020304" pitchFamily="18" charset="0"/>
+            </a:endParaRPr>
+          </a:p>
+          <a:p>
+            <a:pPr marL="742950" marR="0" lvl="1" indent="-285750">
+              <a:lnSpc>
+                <a:spcPct val="107000"/>
+              </a:lnSpc>
+              <a:spcBef>
+                <a:spcPts val="0"/>
+              </a:spcBef>
+              <a:spcAft>
+                <a:spcPts val="0"/>
+              </a:spcAft>
+              <a:buFont typeface="Courier New" panose="02070309020205020404" pitchFamily="49" charset="0"/>
+              <a:buChar char="o"/>
+            </a:pPr>
+            <a:r>
+              <a:rPr lang="en-US" dirty="0">
+                <a:effectLst/>
+                <a:latin typeface="Calibri" panose="020F0502020204030204" pitchFamily="34" charset="0"/>
+                <a:ea typeface="Calibri" panose="020F0502020204030204" pitchFamily="34" charset="0"/>
+                <a:cs typeface="Times New Roman" panose="02020603050405020304" pitchFamily="18" charset="0"/>
+              </a:rPr>
+              <a:t>Variable names, definitions, formatting and contents (especially qualitative variables).</a:t>
+            </a:r>
+          </a:p>
+          <a:p>
+            <a:pPr marL="742950" marR="0" lvl="1" indent="-285750">
+              <a:lnSpc>
+                <a:spcPct val="107000"/>
+              </a:lnSpc>
+              <a:spcBef>
+                <a:spcPts val="0"/>
+              </a:spcBef>
+              <a:spcAft>
+                <a:spcPts val="0"/>
+              </a:spcAft>
+              <a:buFont typeface="Courier New" panose="02070309020205020404" pitchFamily="49" charset="0"/>
+              <a:buChar char="o"/>
+            </a:pPr>
+            <a:r>
+              <a:rPr lang="en-US" dirty="0">
+                <a:effectLst/>
+                <a:latin typeface="Calibri" panose="020F0502020204030204" pitchFamily="34" charset="0"/>
+                <a:ea typeface="Calibri" panose="020F0502020204030204" pitchFamily="34" charset="0"/>
+                <a:cs typeface="Times New Roman" panose="02020603050405020304" pitchFamily="18" charset="0"/>
+              </a:rPr>
+              <a:t>Index key variables (i.e. those used to link different data sets) should be well-defined.</a:t>
+            </a:r>
+          </a:p>
+          <a:p>
+            <a:pPr marL="742950" marR="0" lvl="1" indent="-285750">
+              <a:lnSpc>
+                <a:spcPct val="107000"/>
+              </a:lnSpc>
+              <a:spcBef>
+                <a:spcPts val="0"/>
+              </a:spcBef>
+              <a:spcAft>
+                <a:spcPts val="0"/>
+              </a:spcAft>
+              <a:buFont typeface="Courier New" panose="02070309020205020404" pitchFamily="49" charset="0"/>
+              <a:buChar char="o"/>
+            </a:pPr>
+            <a:r>
+              <a:rPr lang="en-US" dirty="0">
+                <a:effectLst/>
+                <a:latin typeface="Calibri" panose="020F0502020204030204" pitchFamily="34" charset="0"/>
+                <a:ea typeface="Calibri" panose="020F0502020204030204" pitchFamily="34" charset="0"/>
+                <a:cs typeface="Times New Roman" panose="02020603050405020304" pitchFamily="18" charset="0"/>
+              </a:rPr>
+              <a:t>Comment clarifications and corrections.</a:t>
+            </a:r>
+          </a:p>
+          <a:p>
+            <a:pPr marL="742950" marR="0" lvl="1" indent="-285750">
+              <a:lnSpc>
+                <a:spcPct val="107000"/>
+              </a:lnSpc>
+              <a:spcBef>
+                <a:spcPts val="0"/>
+              </a:spcBef>
+              <a:spcAft>
+                <a:spcPts val="0"/>
+              </a:spcAft>
+              <a:buFont typeface="Courier New" panose="02070309020205020404" pitchFamily="49" charset="0"/>
+              <a:buChar char="o"/>
+            </a:pPr>
+            <a:r>
+              <a:rPr lang="en-US" dirty="0">
+                <a:effectLst/>
+                <a:latin typeface="Calibri" panose="020F0502020204030204" pitchFamily="34" charset="0"/>
+                <a:ea typeface="Calibri" panose="020F0502020204030204" pitchFamily="34" charset="0"/>
+                <a:cs typeface="Times New Roman" panose="02020603050405020304" pitchFamily="18" charset="0"/>
+              </a:rPr>
+              <a:t>Basic plots for variables of interest.</a:t>
+            </a:r>
+          </a:p>
+          <a:p>
+            <a:pPr marL="342900" marR="0" lvl="0" indent="-342900">
+              <a:lnSpc>
+                <a:spcPct val="107000"/>
+              </a:lnSpc>
+              <a:spcBef>
+                <a:spcPts val="0"/>
+              </a:spcBef>
+              <a:spcAft>
+                <a:spcPts val="0"/>
+              </a:spcAft>
+              <a:buFont typeface="Symbol" panose="05050102010706020507" pitchFamily="18" charset="2"/>
+              <a:buChar char=""/>
+            </a:pPr>
+            <a:r>
+              <a:rPr lang="en-US" dirty="0">
+                <a:effectLst/>
+                <a:latin typeface="Calibri" panose="020F0502020204030204" pitchFamily="34" charset="0"/>
+                <a:ea typeface="Calibri" panose="020F0502020204030204" pitchFamily="34" charset="0"/>
+                <a:cs typeface="Times New Roman" panose="02020603050405020304" pitchFamily="18" charset="0"/>
+              </a:rPr>
+              <a:t>Note any missing </a:t>
+            </a:r>
+            <a:r>
+              <a:rPr lang="en-US" b="1" dirty="0">
+                <a:effectLst/>
+                <a:latin typeface="Calibri" panose="020F0502020204030204" pitchFamily="34" charset="0"/>
+                <a:ea typeface="Calibri" panose="020F0502020204030204" pitchFamily="34" charset="0"/>
+                <a:cs typeface="Times New Roman" panose="02020603050405020304" pitchFamily="18" charset="0"/>
+              </a:rPr>
+              <a:t>modifications</a:t>
+            </a:r>
+            <a:r>
+              <a:rPr lang="en-US" dirty="0">
+                <a:effectLst/>
+                <a:latin typeface="Calibri" panose="020F0502020204030204" pitchFamily="34" charset="0"/>
+                <a:ea typeface="Calibri" panose="020F0502020204030204" pitchFamily="34" charset="0"/>
+                <a:cs typeface="Times New Roman" panose="02020603050405020304" pitchFamily="18" charset="0"/>
+              </a:rPr>
+              <a:t> that were made to the </a:t>
+            </a:r>
+            <a:r>
+              <a:rPr lang="en-US" b="1" dirty="0">
+                <a:effectLst/>
+                <a:latin typeface="Calibri" panose="020F0502020204030204" pitchFamily="34" charset="0"/>
+                <a:ea typeface="Calibri" panose="020F0502020204030204" pitchFamily="34" charset="0"/>
+                <a:cs typeface="Times New Roman" panose="02020603050405020304" pitchFamily="18" charset="0"/>
+              </a:rPr>
+              <a:t>fishing</a:t>
+            </a:r>
+            <a:r>
+              <a:rPr lang="en-US" dirty="0">
+                <a:effectLst/>
+                <a:latin typeface="Calibri" panose="020F0502020204030204" pitchFamily="34" charset="0"/>
+                <a:ea typeface="Calibri" panose="020F0502020204030204" pitchFamily="34" charset="0"/>
+                <a:cs typeface="Times New Roman" panose="02020603050405020304" pitchFamily="18" charset="0"/>
+              </a:rPr>
+              <a:t> or </a:t>
+            </a:r>
+            <a:r>
+              <a:rPr lang="en-US" b="1" dirty="0">
+                <a:effectLst/>
+                <a:latin typeface="Calibri" panose="020F0502020204030204" pitchFamily="34" charset="0"/>
+                <a:ea typeface="Calibri" panose="020F0502020204030204" pitchFamily="34" charset="0"/>
+                <a:cs typeface="Times New Roman" panose="02020603050405020304" pitchFamily="18" charset="0"/>
+              </a:rPr>
+              <a:t>sampling protocols</a:t>
+            </a:r>
+            <a:r>
+              <a:rPr lang="en-US" dirty="0">
+                <a:effectLst/>
+                <a:latin typeface="Calibri" panose="020F0502020204030204" pitchFamily="34" charset="0"/>
+                <a:ea typeface="Calibri" panose="020F0502020204030204" pitchFamily="34" charset="0"/>
+                <a:cs typeface="Times New Roman" panose="02020603050405020304" pitchFamily="18" charset="0"/>
+              </a:rPr>
+              <a:t>.</a:t>
+            </a:r>
+          </a:p>
+          <a:p>
+            <a:pPr marL="342900" marR="0" lvl="0" indent="-342900">
+              <a:lnSpc>
+                <a:spcPct val="107000"/>
+              </a:lnSpc>
+              <a:spcBef>
+                <a:spcPts val="0"/>
+              </a:spcBef>
+              <a:spcAft>
+                <a:spcPts val="0"/>
+              </a:spcAft>
+              <a:buFont typeface="Symbol" panose="05050102010706020507" pitchFamily="18" charset="2"/>
+              <a:buChar char=""/>
+            </a:pPr>
+            <a:r>
+              <a:rPr lang="en-US" dirty="0">
+                <a:effectLst/>
+                <a:latin typeface="Calibri" panose="020F0502020204030204" pitchFamily="34" charset="0"/>
+                <a:ea typeface="Calibri" panose="020F0502020204030204" pitchFamily="34" charset="0"/>
+                <a:cs typeface="Times New Roman" panose="02020603050405020304" pitchFamily="18" charset="0"/>
+              </a:rPr>
+              <a:t>Discuss possible </a:t>
+            </a:r>
+            <a:r>
+              <a:rPr lang="en-US" b="1" dirty="0">
+                <a:effectLst/>
+                <a:latin typeface="Calibri" panose="020F0502020204030204" pitchFamily="34" charset="0"/>
+                <a:ea typeface="Calibri" panose="020F0502020204030204" pitchFamily="34" charset="0"/>
+                <a:cs typeface="Times New Roman" panose="02020603050405020304" pitchFamily="18" charset="0"/>
+              </a:rPr>
+              <a:t>impacts</a:t>
+            </a:r>
+            <a:r>
+              <a:rPr lang="en-US" dirty="0">
+                <a:effectLst/>
+                <a:latin typeface="Calibri" panose="020F0502020204030204" pitchFamily="34" charset="0"/>
+                <a:ea typeface="Calibri" panose="020F0502020204030204" pitchFamily="34" charset="0"/>
+                <a:cs typeface="Times New Roman" panose="02020603050405020304" pitchFamily="18" charset="0"/>
+              </a:rPr>
+              <a:t> that these modifications or other issues encountered during the study. </a:t>
+            </a:r>
+          </a:p>
+          <a:p>
+            <a:pPr marL="342900" marR="0" lvl="0" indent="-342900">
+              <a:lnSpc>
+                <a:spcPct val="107000"/>
+              </a:lnSpc>
+              <a:spcBef>
+                <a:spcPts val="0"/>
+              </a:spcBef>
+              <a:spcAft>
+                <a:spcPts val="0"/>
+              </a:spcAft>
+              <a:buFont typeface="Symbol" panose="05050102010706020507" pitchFamily="18" charset="2"/>
+              <a:buChar char=""/>
+            </a:pPr>
+            <a:r>
+              <a:rPr lang="en-US" dirty="0">
+                <a:effectLst/>
+                <a:latin typeface="Calibri" panose="020F0502020204030204" pitchFamily="34" charset="0"/>
+                <a:ea typeface="Calibri" panose="020F0502020204030204" pitchFamily="34" charset="0"/>
+                <a:cs typeface="Times New Roman" panose="02020603050405020304" pitchFamily="18" charset="0"/>
+              </a:rPr>
+              <a:t>Make </a:t>
+            </a:r>
+            <a:r>
+              <a:rPr lang="en-US" b="1" dirty="0">
+                <a:effectLst/>
+                <a:latin typeface="Calibri" panose="020F0502020204030204" pitchFamily="34" charset="0"/>
+                <a:ea typeface="Calibri" panose="020F0502020204030204" pitchFamily="34" charset="0"/>
+                <a:cs typeface="Times New Roman" panose="02020603050405020304" pitchFamily="18" charset="0"/>
+              </a:rPr>
+              <a:t>recommendations</a:t>
+            </a:r>
+            <a:r>
+              <a:rPr lang="en-US" dirty="0">
+                <a:effectLst/>
+                <a:latin typeface="Calibri" panose="020F0502020204030204" pitchFamily="34" charset="0"/>
+                <a:ea typeface="Calibri" panose="020F0502020204030204" pitchFamily="34" charset="0"/>
+                <a:cs typeface="Times New Roman" panose="02020603050405020304" pitchFamily="18" charset="0"/>
+              </a:rPr>
+              <a:t> for next iteration of study.</a:t>
+            </a:r>
+          </a:p>
+          <a:p>
+            <a:pPr marL="342900" marR="0" lvl="0" indent="-342900">
+              <a:lnSpc>
+                <a:spcPct val="107000"/>
+              </a:lnSpc>
+              <a:spcBef>
+                <a:spcPts val="0"/>
+              </a:spcBef>
+              <a:spcAft>
+                <a:spcPts val="800"/>
+              </a:spcAft>
+              <a:buFont typeface="Symbol" panose="05050102010706020507" pitchFamily="18" charset="2"/>
+              <a:buChar char=""/>
+            </a:pPr>
+            <a:r>
+              <a:rPr lang="en-US" b="1" dirty="0">
+                <a:effectLst/>
+                <a:latin typeface="Calibri" panose="020F0502020204030204" pitchFamily="34" charset="0"/>
+                <a:ea typeface="Calibri" panose="020F0502020204030204" pitchFamily="34" charset="0"/>
+                <a:cs typeface="Times New Roman" panose="02020603050405020304" pitchFamily="18" charset="0"/>
+              </a:rPr>
+              <a:t>Transfer data</a:t>
+            </a:r>
+            <a:r>
+              <a:rPr lang="en-US" dirty="0">
+                <a:effectLst/>
+                <a:latin typeface="Calibri" panose="020F0502020204030204" pitchFamily="34" charset="0"/>
+                <a:ea typeface="Calibri" panose="020F0502020204030204" pitchFamily="34" charset="0"/>
+                <a:cs typeface="Times New Roman" panose="02020603050405020304" pitchFamily="18" charset="0"/>
+              </a:rPr>
+              <a:t> and </a:t>
+            </a:r>
+            <a:r>
+              <a:rPr lang="en-US" b="1" dirty="0">
+                <a:effectLst/>
+                <a:latin typeface="Calibri" panose="020F0502020204030204" pitchFamily="34" charset="0"/>
+                <a:ea typeface="Calibri" panose="020F0502020204030204" pitchFamily="34" charset="0"/>
+                <a:cs typeface="Times New Roman" panose="02020603050405020304" pitchFamily="18" charset="0"/>
+              </a:rPr>
+              <a:t>metadata</a:t>
+            </a:r>
+            <a:r>
+              <a:rPr lang="en-US" dirty="0">
+                <a:effectLst/>
+                <a:latin typeface="Calibri" panose="020F0502020204030204" pitchFamily="34" charset="0"/>
+                <a:ea typeface="Calibri" panose="020F0502020204030204" pitchFamily="34" charset="0"/>
+                <a:cs typeface="Times New Roman" panose="02020603050405020304" pitchFamily="18" charset="0"/>
+              </a:rPr>
+              <a:t> to study repository.</a:t>
+            </a:r>
+          </a:p>
+        </p:txBody>
+      </p:sp>
+    </p:spTree>
+    <p:extLst>
+      <p:ext uri="{BB962C8B-B14F-4D97-AF65-F5344CB8AC3E}">
+        <p14:creationId xmlns:p14="http://schemas.microsoft.com/office/powerpoint/2010/main" val="2778734308"/>
+      </p:ext>
+    </p:extLst>
+  </p:cSld>
+  <p:clrMapOvr>
+    <a:masterClrMapping/>
+  </p:clrMapOvr>
+</p:sld>
+</file>
+
+<file path=ppt/slides/slide7.xml><?xml version="1.0" encoding="utf-8"?>
+<p:sld xmlns:a="http://schemas.openxmlformats.org/drawingml/2006/main" xmlns:r="http://schemas.openxmlformats.org/officeDocument/2006/relationships" xmlns:p="http://schemas.openxmlformats.org/presentationml/2006/main">
+  <p:cSld>
+    <p:spTree>
+      <p:nvGrpSpPr>
+        <p:cNvPr id="1" name=""/>
+        <p:cNvGrpSpPr/>
+        <p:nvPr/>
+      </p:nvGrpSpPr>
+      <p:grpSpPr>
+        <a:xfrm>
+          <a:off x="0" y="0"/>
+          <a:ext cx="0" cy="0"/>
+          <a:chOff x="0" y="0"/>
+          <a:chExt cx="0" cy="0"/>
+        </a:xfrm>
+      </p:grpSpPr>
+      <p:sp>
+        <p:nvSpPr>
+          <p:cNvPr id="8" name="TextBox 7">
+            <a:extLst>
+              <a:ext uri="{FF2B5EF4-FFF2-40B4-BE49-F238E27FC236}">
+                <a16:creationId xmlns:a16="http://schemas.microsoft.com/office/drawing/2014/main" id="{A9B9FB08-CEF4-AABF-2B94-D3BCA0ECDC35}"/>
+              </a:ext>
+            </a:extLst>
+          </p:cNvPr>
+          <p:cNvSpPr txBox="1"/>
+          <p:nvPr/>
+        </p:nvSpPr>
+        <p:spPr>
+          <a:xfrm>
+            <a:off x="5279033" y="2563523"/>
+            <a:ext cx="1498663" cy="646331"/>
           </a:xfrm>
           <a:prstGeom prst="rect">
             <a:avLst/>
@@ -3358,6 +5158,397 @@
           <a:p>
             <a:pPr algn="ctr"/>
             <a:r>
+              <a:rPr lang="fr-CA" dirty="0"/>
+              <a:t>Field observations</a:t>
+            </a:r>
+            <a:endParaRPr lang="en-US" dirty="0"/>
+          </a:p>
+        </p:txBody>
+      </p:sp>
+      <p:sp>
+        <p:nvSpPr>
+          <p:cNvPr id="9" name="TextBox 8">
+            <a:extLst>
+              <a:ext uri="{FF2B5EF4-FFF2-40B4-BE49-F238E27FC236}">
+                <a16:creationId xmlns:a16="http://schemas.microsoft.com/office/drawing/2014/main" id="{FF7803D6-6ACB-B20B-5CB1-1DEE49F562BA}"/>
+              </a:ext>
+            </a:extLst>
+          </p:cNvPr>
+          <p:cNvSpPr txBox="1"/>
+          <p:nvPr/>
+        </p:nvSpPr>
+        <p:spPr>
+          <a:xfrm>
+            <a:off x="5279033" y="1756511"/>
+            <a:ext cx="1498663" cy="646331"/>
+          </a:xfrm>
+          <a:prstGeom prst="rect">
+            <a:avLst/>
+          </a:prstGeom>
+          <a:noFill/>
+          <a:ln>
+            <a:solidFill>
+              <a:schemeClr val="bg2">
+                <a:lumMod val="50000"/>
+              </a:schemeClr>
+            </a:solidFill>
+          </a:ln>
+        </p:spPr>
+        <p:txBody>
+          <a:bodyPr wrap="square" rtlCol="0">
+            <a:spAutoFit/>
+          </a:bodyPr>
+          <a:lstStyle/>
+          <a:p>
+            <a:pPr algn="ctr"/>
+            <a:r>
+              <a:rPr lang="fr-CA" dirty="0" err="1"/>
+              <a:t>Biological</a:t>
+            </a:r>
+            <a:r>
+              <a:rPr lang="fr-CA" dirty="0"/>
+              <a:t> observations</a:t>
+            </a:r>
+            <a:endParaRPr lang="en-US" dirty="0"/>
+          </a:p>
+        </p:txBody>
+      </p:sp>
+      <p:sp>
+        <p:nvSpPr>
+          <p:cNvPr id="29" name="TextBox 28">
+            <a:extLst>
+              <a:ext uri="{FF2B5EF4-FFF2-40B4-BE49-F238E27FC236}">
+                <a16:creationId xmlns:a16="http://schemas.microsoft.com/office/drawing/2014/main" id="{8BF3510F-A0B7-CBDE-0BAE-9DBDB968EF51}"/>
+              </a:ext>
+            </a:extLst>
+          </p:cNvPr>
+          <p:cNvSpPr txBox="1"/>
+          <p:nvPr/>
+        </p:nvSpPr>
+        <p:spPr>
+          <a:xfrm>
+            <a:off x="2757978" y="1053675"/>
+            <a:ext cx="1030282" cy="461665"/>
+          </a:xfrm>
+          <a:prstGeom prst="rect">
+            <a:avLst/>
+          </a:prstGeom>
+          <a:noFill/>
+        </p:spPr>
+        <p:txBody>
+          <a:bodyPr wrap="none" rtlCol="0">
+            <a:spAutoFit/>
+          </a:bodyPr>
+          <a:lstStyle/>
+          <a:p>
+            <a:r>
+              <a:rPr lang="fr-CA" sz="2400" b="1" dirty="0" err="1"/>
+              <a:t>Before</a:t>
+            </a:r>
+            <a:endParaRPr lang="en-US" sz="2400" b="1" dirty="0"/>
+          </a:p>
+        </p:txBody>
+      </p:sp>
+      <p:sp>
+        <p:nvSpPr>
+          <p:cNvPr id="30" name="TextBox 29">
+            <a:extLst>
+              <a:ext uri="{FF2B5EF4-FFF2-40B4-BE49-F238E27FC236}">
+                <a16:creationId xmlns:a16="http://schemas.microsoft.com/office/drawing/2014/main" id="{4D2073D1-75DB-D2AF-EE4D-E62A8D79F561}"/>
+              </a:ext>
+            </a:extLst>
+          </p:cNvPr>
+          <p:cNvSpPr txBox="1"/>
+          <p:nvPr/>
+        </p:nvSpPr>
+        <p:spPr>
+          <a:xfrm>
+            <a:off x="5508829" y="1060099"/>
+            <a:ext cx="1039067" cy="461665"/>
+          </a:xfrm>
+          <a:prstGeom prst="rect">
+            <a:avLst/>
+          </a:prstGeom>
+          <a:noFill/>
+        </p:spPr>
+        <p:txBody>
+          <a:bodyPr wrap="none" rtlCol="0">
+            <a:spAutoFit/>
+          </a:bodyPr>
+          <a:lstStyle/>
+          <a:p>
+            <a:r>
+              <a:rPr lang="fr-CA" sz="2400" b="1" dirty="0" err="1"/>
+              <a:t>During</a:t>
+            </a:r>
+            <a:endParaRPr lang="en-US" sz="2400" b="1" dirty="0"/>
+          </a:p>
+        </p:txBody>
+      </p:sp>
+      <p:sp>
+        <p:nvSpPr>
+          <p:cNvPr id="40" name="TextBox 39">
+            <a:extLst>
+              <a:ext uri="{FF2B5EF4-FFF2-40B4-BE49-F238E27FC236}">
+                <a16:creationId xmlns:a16="http://schemas.microsoft.com/office/drawing/2014/main" id="{D57B5BA0-3BAF-B7E5-5CC2-97406BBFFD1D}"/>
+              </a:ext>
+            </a:extLst>
+          </p:cNvPr>
+          <p:cNvSpPr txBox="1"/>
+          <p:nvPr/>
+        </p:nvSpPr>
+        <p:spPr>
+          <a:xfrm>
+            <a:off x="5279030" y="4238840"/>
+            <a:ext cx="1498663" cy="369332"/>
+          </a:xfrm>
+          <a:prstGeom prst="rect">
+            <a:avLst/>
+          </a:prstGeom>
+          <a:solidFill>
+            <a:schemeClr val="accent1">
+              <a:lumMod val="20000"/>
+              <a:lumOff val="80000"/>
+            </a:schemeClr>
+          </a:solidFill>
+          <a:ln>
+            <a:solidFill>
+              <a:schemeClr val="bg2">
+                <a:lumMod val="50000"/>
+              </a:schemeClr>
+            </a:solidFill>
+          </a:ln>
+        </p:spPr>
+        <p:txBody>
+          <a:bodyPr wrap="square" rtlCol="0">
+            <a:spAutoFit/>
+          </a:bodyPr>
+          <a:lstStyle/>
+          <a:p>
+            <a:pPr algn="ctr"/>
+            <a:r>
+              <a:rPr lang="fr-CA" dirty="0"/>
+              <a:t>Data</a:t>
+            </a:r>
+            <a:endParaRPr lang="en-US" dirty="0"/>
+          </a:p>
+        </p:txBody>
+      </p:sp>
+      <p:cxnSp>
+        <p:nvCxnSpPr>
+          <p:cNvPr id="41" name="Straight Arrow Connector 40">
+            <a:extLst>
+              <a:ext uri="{FF2B5EF4-FFF2-40B4-BE49-F238E27FC236}">
+                <a16:creationId xmlns:a16="http://schemas.microsoft.com/office/drawing/2014/main" id="{4D6DF1E8-B4B8-5CBD-D853-CFA2F31389EC}"/>
+              </a:ext>
+            </a:extLst>
+          </p:cNvPr>
+          <p:cNvCxnSpPr>
+            <a:cxnSpLocks/>
+            <a:stCxn id="8" idx="2"/>
+            <a:endCxn id="25" idx="0"/>
+          </p:cNvCxnSpPr>
+          <p:nvPr/>
+        </p:nvCxnSpPr>
+        <p:spPr>
+          <a:xfrm>
+            <a:off x="6028365" y="3209854"/>
+            <a:ext cx="0" cy="164546"/>
+          </a:xfrm>
+          <a:prstGeom prst="straightConnector1">
+            <a:avLst/>
+          </a:prstGeom>
+          <a:ln>
+            <a:tailEnd type="triangle"/>
+          </a:ln>
+        </p:spPr>
+        <p:style>
+          <a:lnRef idx="1">
+            <a:schemeClr val="accent1"/>
+          </a:lnRef>
+          <a:fillRef idx="0">
+            <a:schemeClr val="accent1"/>
+          </a:fillRef>
+          <a:effectRef idx="0">
+            <a:schemeClr val="accent1"/>
+          </a:effectRef>
+          <a:fontRef idx="minor">
+            <a:schemeClr val="tx1"/>
+          </a:fontRef>
+        </p:style>
+      </p:cxnSp>
+      <p:cxnSp>
+        <p:nvCxnSpPr>
+          <p:cNvPr id="45" name="Straight Arrow Connector 44">
+            <a:extLst>
+              <a:ext uri="{FF2B5EF4-FFF2-40B4-BE49-F238E27FC236}">
+                <a16:creationId xmlns:a16="http://schemas.microsoft.com/office/drawing/2014/main" id="{B8CEB4D2-C3ED-1547-E646-50D7D23F7F2D}"/>
+              </a:ext>
+            </a:extLst>
+          </p:cNvPr>
+          <p:cNvCxnSpPr>
+            <a:cxnSpLocks/>
+            <a:stCxn id="9" idx="2"/>
+            <a:endCxn id="8" idx="0"/>
+          </p:cNvCxnSpPr>
+          <p:nvPr/>
+        </p:nvCxnSpPr>
+        <p:spPr>
+          <a:xfrm>
+            <a:off x="6028365" y="2402842"/>
+            <a:ext cx="0" cy="160681"/>
+          </a:xfrm>
+          <a:prstGeom prst="straightConnector1">
+            <a:avLst/>
+          </a:prstGeom>
+          <a:ln>
+            <a:tailEnd type="triangle"/>
+          </a:ln>
+        </p:spPr>
+        <p:style>
+          <a:lnRef idx="1">
+            <a:schemeClr val="accent1"/>
+          </a:lnRef>
+          <a:fillRef idx="0">
+            <a:schemeClr val="accent1"/>
+          </a:fillRef>
+          <a:effectRef idx="0">
+            <a:schemeClr val="accent1"/>
+          </a:effectRef>
+          <a:fontRef idx="minor">
+            <a:schemeClr val="tx1"/>
+          </a:fontRef>
+        </p:style>
+      </p:cxnSp>
+      <p:sp>
+        <p:nvSpPr>
+          <p:cNvPr id="25" name="TextBox 24">
+            <a:extLst>
+              <a:ext uri="{FF2B5EF4-FFF2-40B4-BE49-F238E27FC236}">
+                <a16:creationId xmlns:a16="http://schemas.microsoft.com/office/drawing/2014/main" id="{EDC96B2F-2C31-5BEF-3382-68079D156D6B}"/>
+              </a:ext>
+            </a:extLst>
+          </p:cNvPr>
+          <p:cNvSpPr txBox="1"/>
+          <p:nvPr/>
+        </p:nvSpPr>
+        <p:spPr>
+          <a:xfrm>
+            <a:off x="5279033" y="3374400"/>
+            <a:ext cx="1498663" cy="369332"/>
+          </a:xfrm>
+          <a:prstGeom prst="rect">
+            <a:avLst/>
+          </a:prstGeom>
+          <a:noFill/>
+          <a:ln>
+            <a:solidFill>
+              <a:schemeClr val="bg2">
+                <a:lumMod val="50000"/>
+              </a:schemeClr>
+            </a:solidFill>
+          </a:ln>
+        </p:spPr>
+        <p:txBody>
+          <a:bodyPr wrap="square" rtlCol="0">
+            <a:spAutoFit/>
+          </a:bodyPr>
+          <a:lstStyle/>
+          <a:p>
+            <a:pPr algn="ctr"/>
+            <a:r>
+              <a:rPr lang="fr-CA" dirty="0"/>
+              <a:t>Photos</a:t>
+            </a:r>
+            <a:endParaRPr lang="en-US" dirty="0"/>
+          </a:p>
+        </p:txBody>
+      </p:sp>
+      <p:cxnSp>
+        <p:nvCxnSpPr>
+          <p:cNvPr id="26" name="Straight Arrow Connector 25">
+            <a:extLst>
+              <a:ext uri="{FF2B5EF4-FFF2-40B4-BE49-F238E27FC236}">
+                <a16:creationId xmlns:a16="http://schemas.microsoft.com/office/drawing/2014/main" id="{D11E0A5B-B8C0-A281-AA99-74F929395493}"/>
+              </a:ext>
+            </a:extLst>
+          </p:cNvPr>
+          <p:cNvCxnSpPr>
+            <a:cxnSpLocks/>
+            <a:stCxn id="25" idx="2"/>
+            <a:endCxn id="40" idx="0"/>
+          </p:cNvCxnSpPr>
+          <p:nvPr/>
+        </p:nvCxnSpPr>
+        <p:spPr>
+          <a:xfrm flipH="1">
+            <a:off x="6028362" y="3743732"/>
+            <a:ext cx="3" cy="495108"/>
+          </a:xfrm>
+          <a:prstGeom prst="straightConnector1">
+            <a:avLst/>
+          </a:prstGeom>
+          <a:ln>
+            <a:tailEnd type="triangle"/>
+          </a:ln>
+        </p:spPr>
+        <p:style>
+          <a:lnRef idx="1">
+            <a:schemeClr val="accent1"/>
+          </a:lnRef>
+          <a:fillRef idx="0">
+            <a:schemeClr val="accent1"/>
+          </a:fillRef>
+          <a:effectRef idx="0">
+            <a:schemeClr val="accent1"/>
+          </a:effectRef>
+          <a:fontRef idx="minor">
+            <a:schemeClr val="tx1"/>
+          </a:fontRef>
+        </p:style>
+      </p:cxnSp>
+      <p:sp>
+        <p:nvSpPr>
+          <p:cNvPr id="4" name="TextBox 3">
+            <a:extLst>
+              <a:ext uri="{FF2B5EF4-FFF2-40B4-BE49-F238E27FC236}">
+                <a16:creationId xmlns:a16="http://schemas.microsoft.com/office/drawing/2014/main" id="{15BABAAE-A443-4590-95E6-B0DBC328EDA9}"/>
+              </a:ext>
+            </a:extLst>
+          </p:cNvPr>
+          <p:cNvSpPr txBox="1"/>
+          <p:nvPr/>
+        </p:nvSpPr>
+        <p:spPr>
+          <a:xfrm>
+            <a:off x="5279033" y="5825989"/>
+            <a:ext cx="1498663" cy="369332"/>
+          </a:xfrm>
+          <a:prstGeom prst="rect">
+            <a:avLst/>
+          </a:prstGeom>
+          <a:solidFill>
+            <a:schemeClr val="accent1">
+              <a:lumMod val="20000"/>
+              <a:lumOff val="80000"/>
+            </a:schemeClr>
+          </a:solidFill>
+          <a:ln>
+            <a:solidFill>
+              <a:schemeClr val="bg2">
+                <a:lumMod val="50000"/>
+              </a:schemeClr>
+            </a:solidFill>
+          </a:ln>
+        </p:spPr>
+        <p:txBody>
+          <a:bodyPr wrap="square" rtlCol="0">
+            <a:spAutoFit/>
+          </a:bodyPr>
+          <a:lstStyle/>
+          <a:p>
+            <a:pPr algn="ctr"/>
+            <a:r>
               <a:rPr lang="fr-CA" dirty="0" err="1"/>
               <a:t>Metadata</a:t>
             </a:r>
@@ -3379,7 +5570,7 @@
         </p:nvSpPr>
         <p:spPr>
           <a:xfrm>
-            <a:off x="9269964" y="854292"/>
+            <a:off x="2652377" y="2294136"/>
             <a:ext cx="1241485" cy="646331"/>
           </a:xfrm>
           <a:prstGeom prst="rect">
@@ -3427,7 +5618,7 @@
         </p:nvSpPr>
         <p:spPr>
           <a:xfrm>
-            <a:off x="10718206" y="854293"/>
+            <a:off x="2652377" y="3112410"/>
             <a:ext cx="1241485" cy="646331"/>
           </a:xfrm>
           <a:prstGeom prst="rect">
@@ -3461,98 +5652,6 @@
           </a:p>
         </p:txBody>
       </p:sp>
-      <p:sp>
-        <p:nvSpPr>
-          <p:cNvPr id="8" name="TextBox 7">
-            <a:extLst>
-              <a:ext uri="{FF2B5EF4-FFF2-40B4-BE49-F238E27FC236}">
-                <a16:creationId xmlns:a16="http://schemas.microsoft.com/office/drawing/2014/main" id="{A9B9FB08-CEF4-AABF-2B94-D3BCA0ECDC35}"/>
-              </a:ext>
-            </a:extLst>
-          </p:cNvPr>
-          <p:cNvSpPr txBox="1"/>
-          <p:nvPr/>
-        </p:nvSpPr>
-        <p:spPr>
-          <a:xfrm>
-            <a:off x="3715728" y="2994459"/>
-            <a:ext cx="1498663" cy="646331"/>
-          </a:xfrm>
-          <a:prstGeom prst="rect">
-            <a:avLst/>
-          </a:prstGeom>
-          <a:noFill/>
-          <a:ln>
-            <a:solidFill>
-              <a:schemeClr val="bg2">
-                <a:lumMod val="50000"/>
-              </a:schemeClr>
-            </a:solidFill>
-          </a:ln>
-        </p:spPr>
-        <p:txBody>
-          <a:bodyPr wrap="square" rtlCol="0">
-            <a:spAutoFit/>
-          </a:bodyPr>
-          <a:lstStyle/>
-          <a:p>
-            <a:pPr algn="ctr"/>
-            <a:r>
-              <a:rPr lang="fr-CA" dirty="0"/>
-              <a:t>Field observations</a:t>
-            </a:r>
-            <a:endParaRPr lang="en-US" dirty="0"/>
-          </a:p>
-        </p:txBody>
-      </p:sp>
-      <p:sp>
-        <p:nvSpPr>
-          <p:cNvPr id="9" name="TextBox 8">
-            <a:extLst>
-              <a:ext uri="{FF2B5EF4-FFF2-40B4-BE49-F238E27FC236}">
-                <a16:creationId xmlns:a16="http://schemas.microsoft.com/office/drawing/2014/main" id="{FF7803D6-6ACB-B20B-5CB1-1DEE49F562BA}"/>
-              </a:ext>
-            </a:extLst>
-          </p:cNvPr>
-          <p:cNvSpPr txBox="1"/>
-          <p:nvPr/>
-        </p:nvSpPr>
-        <p:spPr>
-          <a:xfrm>
-            <a:off x="3715728" y="3849718"/>
-            <a:ext cx="1498663" cy="646331"/>
-          </a:xfrm>
-          <a:prstGeom prst="rect">
-            <a:avLst/>
-          </a:prstGeom>
-          <a:noFill/>
-          <a:ln>
-            <a:solidFill>
-              <a:schemeClr val="bg2">
-                <a:lumMod val="50000"/>
-              </a:schemeClr>
-            </a:solidFill>
-          </a:ln>
-        </p:spPr>
-        <p:txBody>
-          <a:bodyPr wrap="square" rtlCol="0">
-            <a:spAutoFit/>
-          </a:bodyPr>
-          <a:lstStyle/>
-          <a:p>
-            <a:pPr algn="ctr"/>
-            <a:r>
-              <a:rPr lang="fr-CA" dirty="0" err="1"/>
-              <a:t>Biological</a:t>
-            </a:r>
-            <a:r>
-              <a:rPr lang="fr-CA" dirty="0"/>
-              <a:t> observations</a:t>
-            </a:r>
-            <a:endParaRPr lang="en-US" dirty="0"/>
-          </a:p>
-        </p:txBody>
-      </p:sp>
       <p:cxnSp>
         <p:nvCxnSpPr>
           <p:cNvPr id="11" name="Straight Arrow Connector 10">
@@ -3563,15 +5662,16 @@
             </a:extLst>
           </p:cNvPr>
           <p:cNvCxnSpPr>
-            <a:stCxn id="6" idx="2"/>
+            <a:cxnSpLocks/>
+            <a:stCxn id="6" idx="3"/>
             <a:endCxn id="4" idx="0"/>
           </p:cNvCxnSpPr>
           <p:nvPr/>
         </p:nvCxnSpPr>
         <p:spPr>
-          <a:xfrm flipH="1">
-            <a:off x="9873885" y="1500623"/>
-            <a:ext cx="16822" cy="989882"/>
+          <a:xfrm>
+            <a:off x="3893862" y="2617302"/>
+            <a:ext cx="2134503" cy="3208687"/>
           </a:xfrm>
           <a:prstGeom prst="straightConnector1">
             <a:avLst/>
@@ -3606,15 +5706,15 @@
           </p:cNvPr>
           <p:cNvCxnSpPr>
             <a:cxnSpLocks/>
-            <a:stCxn id="7" idx="2"/>
+            <a:stCxn id="7" idx="3"/>
             <a:endCxn id="4" idx="0"/>
           </p:cNvCxnSpPr>
           <p:nvPr/>
         </p:nvCxnSpPr>
         <p:spPr>
-          <a:xfrm flipH="1">
-            <a:off x="9873885" y="1500624"/>
-            <a:ext cx="1465064" cy="989881"/>
+          <a:xfrm>
+            <a:off x="3893862" y="3435576"/>
+            <a:ext cx="2134503" cy="2390413"/>
           </a:xfrm>
           <a:prstGeom prst="straightConnector1">
             <a:avLst/>
@@ -3652,7 +5752,7 @@
         </p:nvSpPr>
         <p:spPr>
           <a:xfrm>
-            <a:off x="7800490" y="992791"/>
+            <a:off x="2652377" y="1750087"/>
             <a:ext cx="1241485" cy="369332"/>
           </a:xfrm>
           <a:prstGeom prst="rect">
@@ -3697,15 +5797,15 @@
           </p:cNvPr>
           <p:cNvCxnSpPr>
             <a:cxnSpLocks/>
-            <a:stCxn id="21" idx="2"/>
+            <a:stCxn id="21" idx="3"/>
             <a:endCxn id="4" idx="0"/>
           </p:cNvCxnSpPr>
           <p:nvPr/>
         </p:nvCxnSpPr>
         <p:spPr>
           <a:xfrm>
-            <a:off x="8421233" y="1362123"/>
-            <a:ext cx="1452652" cy="1128382"/>
+            <a:off x="3893862" y="1934753"/>
+            <a:ext cx="2134503" cy="3891236"/>
           </a:xfrm>
           <a:prstGeom prst="straightConnector1">
             <a:avLst/>
@@ -3731,10 +5831,10 @@
       </p:cxnSp>
       <p:sp>
         <p:nvSpPr>
-          <p:cNvPr id="29" name="TextBox 28">
-            <a:extLst>
-              <a:ext uri="{FF2B5EF4-FFF2-40B4-BE49-F238E27FC236}">
-                <a16:creationId xmlns:a16="http://schemas.microsoft.com/office/drawing/2014/main" id="{8BF3510F-A0B7-CBDE-0BAE-9DBDB968EF51}"/>
+          <p:cNvPr id="64" name="TextBox 63">
+            <a:extLst>
+              <a:ext uri="{FF2B5EF4-FFF2-40B4-BE49-F238E27FC236}">
+                <a16:creationId xmlns:a16="http://schemas.microsoft.com/office/drawing/2014/main" id="{671D557F-A2F1-BA8C-CD3C-6FB5CB21885C}"/>
               </a:ext>
             </a:extLst>
           </p:cNvPr>
@@ -3743,54 +5843,85 @@
         </p:nvSpPr>
         <p:spPr>
           <a:xfrm>
-            <a:off x="980107" y="1464056"/>
-            <a:ext cx="2735621" cy="369332"/>
+            <a:off x="8162862" y="1685046"/>
+            <a:ext cx="1339641" cy="646331"/>
           </a:xfrm>
           <a:prstGeom prst="rect">
             <a:avLst/>
           </a:prstGeom>
           <a:noFill/>
+          <a:ln>
+            <a:solidFill>
+              <a:schemeClr val="bg2">
+                <a:lumMod val="50000"/>
+              </a:schemeClr>
+            </a:solidFill>
+          </a:ln>
         </p:spPr>
         <p:txBody>
-          <a:bodyPr wrap="none" rtlCol="0">
+          <a:bodyPr wrap="square" rtlCol="0">
             <a:spAutoFit/>
           </a:bodyPr>
           <a:lstStyle/>
           <a:p>
-            <a:r>
-              <a:rPr lang="fr-CA" dirty="0" err="1"/>
-              <a:t>Before</a:t>
-            </a:r>
+            <a:pPr algn="ctr"/>
             <a:r>
               <a:rPr lang="fr-CA" dirty="0"/>
-              <a:t> </a:t>
-            </a:r>
-            <a:r>
-              <a:rPr lang="fr-CA" dirty="0" err="1"/>
-              <a:t>leaving</a:t>
-            </a:r>
-            <a:r>
-              <a:rPr lang="fr-CA" dirty="0"/>
-              <a:t> for the </a:t>
-            </a:r>
-            <a:r>
-              <a:rPr lang="fr-CA" dirty="0" err="1"/>
-              <a:t>field</a:t>
-            </a:r>
-            <a:r>
-              <a:rPr lang="fr-CA" dirty="0"/>
-              <a:t>:</a:t>
+              <a:t>Sampling issues</a:t>
             </a:r>
             <a:endParaRPr lang="en-US" dirty="0"/>
           </a:p>
         </p:txBody>
       </p:sp>
-      <p:sp>
-        <p:nvSpPr>
-          <p:cNvPr id="30" name="TextBox 29">
-            <a:extLst>
-              <a:ext uri="{FF2B5EF4-FFF2-40B4-BE49-F238E27FC236}">
-                <a16:creationId xmlns:a16="http://schemas.microsoft.com/office/drawing/2014/main" id="{4D2073D1-75DB-D2AF-EE4D-E62A8D79F561}"/>
+      <p:cxnSp>
+        <p:nvCxnSpPr>
+          <p:cNvPr id="67" name="Straight Arrow Connector 66">
+            <a:extLst>
+              <a:ext uri="{FF2B5EF4-FFF2-40B4-BE49-F238E27FC236}">
+                <a16:creationId xmlns:a16="http://schemas.microsoft.com/office/drawing/2014/main" id="{70C9BBEE-497A-EB96-B8A3-C98D8E850EBC}"/>
+              </a:ext>
+            </a:extLst>
+          </p:cNvPr>
+          <p:cNvCxnSpPr>
+            <a:cxnSpLocks/>
+            <a:stCxn id="64" idx="1"/>
+            <a:endCxn id="4" idx="0"/>
+          </p:cNvCxnSpPr>
+          <p:nvPr/>
+        </p:nvCxnSpPr>
+        <p:spPr>
+          <a:xfrm flipH="1">
+            <a:off x="6028365" y="2008212"/>
+            <a:ext cx="2134497" cy="3817777"/>
+          </a:xfrm>
+          <a:prstGeom prst="straightConnector1">
+            <a:avLst/>
+          </a:prstGeom>
+          <a:ln>
+            <a:tailEnd type="triangle"/>
+          </a:ln>
+        </p:spPr>
+        <p:style>
+          <a:lnRef idx="1">
+            <a:schemeClr val="accent1"/>
+          </a:lnRef>
+          <a:fillRef idx="0">
+            <a:schemeClr val="accent1"/>
+          </a:fillRef>
+          <a:effectRef idx="0">
+            <a:schemeClr val="accent1"/>
+          </a:effectRef>
+          <a:fontRef idx="minor">
+            <a:schemeClr val="tx1"/>
+          </a:fontRef>
+        </p:style>
+      </p:cxnSp>
+      <p:sp>
+        <p:nvSpPr>
+          <p:cNvPr id="17" name="TextBox 16">
+            <a:extLst>
+              <a:ext uri="{FF2B5EF4-FFF2-40B4-BE49-F238E27FC236}">
+                <a16:creationId xmlns:a16="http://schemas.microsoft.com/office/drawing/2014/main" id="{26E98DBD-E73C-B0C2-198A-4C976042BAC5}"/>
               </a:ext>
             </a:extLst>
           </p:cNvPr>
@@ -3799,99 +5930,7 @@
         </p:nvSpPr>
         <p:spPr>
           <a:xfrm>
-            <a:off x="1029026" y="2490505"/>
-            <a:ext cx="1313180" cy="369332"/>
-          </a:xfrm>
-          <a:prstGeom prst="rect">
-            <a:avLst/>
-          </a:prstGeom>
-          <a:noFill/>
-        </p:spPr>
-        <p:txBody>
-          <a:bodyPr wrap="none" rtlCol="0">
-            <a:spAutoFit/>
-          </a:bodyPr>
-          <a:lstStyle/>
-          <a:p>
-            <a:r>
-              <a:rPr lang="fr-CA" dirty="0"/>
-              <a:t>In the </a:t>
-            </a:r>
-            <a:r>
-              <a:rPr lang="fr-CA" dirty="0" err="1"/>
-              <a:t>field</a:t>
-            </a:r>
-            <a:r>
-              <a:rPr lang="fr-CA" dirty="0"/>
-              <a:t> :</a:t>
-            </a:r>
-            <a:endParaRPr lang="en-US" dirty="0"/>
-          </a:p>
-        </p:txBody>
-      </p:sp>
-      <p:sp>
-        <p:nvSpPr>
-          <p:cNvPr id="31" name="TextBox 30">
-            <a:extLst>
-              <a:ext uri="{FF2B5EF4-FFF2-40B4-BE49-F238E27FC236}">
-                <a16:creationId xmlns:a16="http://schemas.microsoft.com/office/drawing/2014/main" id="{50573054-38FC-D7C9-494C-83C869AFF185}"/>
-              </a:ext>
-            </a:extLst>
-          </p:cNvPr>
-          <p:cNvSpPr txBox="1"/>
-          <p:nvPr/>
-        </p:nvSpPr>
-        <p:spPr>
-          <a:xfrm>
-            <a:off x="1029026" y="5390626"/>
-            <a:ext cx="1607235" cy="369332"/>
-          </a:xfrm>
-          <a:prstGeom prst="rect">
-            <a:avLst/>
-          </a:prstGeom>
-          <a:noFill/>
-        </p:spPr>
-        <p:txBody>
-          <a:bodyPr wrap="none" rtlCol="0">
-            <a:spAutoFit/>
-          </a:bodyPr>
-          <a:lstStyle/>
-          <a:p>
-            <a:r>
-              <a:rPr lang="fr-CA" dirty="0" err="1"/>
-              <a:t>After</a:t>
-            </a:r>
-            <a:r>
-              <a:rPr lang="fr-CA" dirty="0"/>
-              <a:t> the </a:t>
-            </a:r>
-            <a:r>
-              <a:rPr lang="fr-CA" dirty="0" err="1"/>
-              <a:t>field</a:t>
-            </a:r>
-            <a:r>
-              <a:rPr lang="fr-CA" dirty="0"/>
-              <a:t> :</a:t>
-            </a:r>
-            <a:endParaRPr lang="en-US" dirty="0"/>
-          </a:p>
-        </p:txBody>
-      </p:sp>
-      <p:sp>
-        <p:nvSpPr>
-          <p:cNvPr id="40" name="TextBox 39">
-            <a:extLst>
-              <a:ext uri="{FF2B5EF4-FFF2-40B4-BE49-F238E27FC236}">
-                <a16:creationId xmlns:a16="http://schemas.microsoft.com/office/drawing/2014/main" id="{D57B5BA0-3BAF-B7E5-5CC2-97406BBFFD1D}"/>
-              </a:ext>
-            </a:extLst>
-          </p:cNvPr>
-          <p:cNvSpPr txBox="1"/>
-          <p:nvPr/>
-        </p:nvSpPr>
-        <p:spPr>
-          <a:xfrm>
-            <a:off x="9253141" y="3480386"/>
+            <a:off x="2652377" y="3930684"/>
             <a:ext cx="1241485" cy="369332"/>
           </a:xfrm>
           <a:prstGeom prst="rect">
@@ -3914,8 +5953,8 @@
           <a:p>
             <a:pPr algn="ctr"/>
             <a:r>
-              <a:rPr lang="fr-CA" dirty="0"/>
-              <a:t>data</a:t>
+              <a:rPr lang="fr-CA" dirty="0" err="1"/>
+              <a:t>References</a:t>
             </a:r>
             <a:endParaRPr lang="en-US" dirty="0"/>
           </a:p>
@@ -3923,24 +5962,163 @@
       </p:sp>
       <p:cxnSp>
         <p:nvCxnSpPr>
-          <p:cNvPr id="41" name="Straight Arrow Connector 40">
-            <a:extLst>
-              <a:ext uri="{FF2B5EF4-FFF2-40B4-BE49-F238E27FC236}">
-                <a16:creationId xmlns:a16="http://schemas.microsoft.com/office/drawing/2014/main" id="{4D6DF1E8-B4B8-5CBD-D853-CFA2F31389EC}"/>
+          <p:cNvPr id="18" name="Straight Arrow Connector 17">
+            <a:extLst>
+              <a:ext uri="{FF2B5EF4-FFF2-40B4-BE49-F238E27FC236}">
+                <a16:creationId xmlns:a16="http://schemas.microsoft.com/office/drawing/2014/main" id="{361AF502-5146-1F64-8472-837AE5EA3C63}"/>
               </a:ext>
             </a:extLst>
           </p:cNvPr>
           <p:cNvCxnSpPr>
             <a:cxnSpLocks/>
-            <a:stCxn id="8" idx="3"/>
-            <a:endCxn id="40" idx="1"/>
+            <a:stCxn id="17" idx="3"/>
+            <a:endCxn id="4" idx="0"/>
           </p:cNvCxnSpPr>
           <p:nvPr/>
         </p:nvCxnSpPr>
         <p:spPr>
           <a:xfrm>
-            <a:off x="5214391" y="3317625"/>
-            <a:ext cx="4038750" cy="347427"/>
+            <a:off x="3893862" y="4115350"/>
+            <a:ext cx="2134503" cy="1710639"/>
+          </a:xfrm>
+          <a:prstGeom prst="straightConnector1">
+            <a:avLst/>
+          </a:prstGeom>
+          <a:ln>
+            <a:tailEnd type="triangle"/>
+          </a:ln>
+        </p:spPr>
+        <p:style>
+          <a:lnRef idx="1">
+            <a:schemeClr val="accent1"/>
+          </a:lnRef>
+          <a:fillRef idx="0">
+            <a:schemeClr val="accent1"/>
+          </a:fillRef>
+          <a:effectRef idx="0">
+            <a:schemeClr val="accent1"/>
+          </a:effectRef>
+          <a:fontRef idx="minor">
+            <a:schemeClr val="tx1"/>
+          </a:fontRef>
+        </p:style>
+      </p:cxnSp>
+      <p:sp>
+        <p:nvSpPr>
+          <p:cNvPr id="48" name="TextBox 47">
+            <a:extLst>
+              <a:ext uri="{FF2B5EF4-FFF2-40B4-BE49-F238E27FC236}">
+                <a16:creationId xmlns:a16="http://schemas.microsoft.com/office/drawing/2014/main" id="{730EBA90-9E32-D97B-0ADE-2B831007839C}"/>
+              </a:ext>
+            </a:extLst>
+          </p:cNvPr>
+          <p:cNvSpPr txBox="1"/>
+          <p:nvPr/>
+        </p:nvSpPr>
+        <p:spPr>
+          <a:xfrm>
+            <a:off x="8162862" y="2563524"/>
+            <a:ext cx="1339641" cy="646331"/>
+          </a:xfrm>
+          <a:prstGeom prst="rect">
+            <a:avLst/>
+          </a:prstGeom>
+          <a:noFill/>
+          <a:ln>
+            <a:solidFill>
+              <a:schemeClr val="bg2">
+                <a:lumMod val="50000"/>
+              </a:schemeClr>
+            </a:solidFill>
+          </a:ln>
+        </p:spPr>
+        <p:txBody>
+          <a:bodyPr wrap="square" rtlCol="0">
+            <a:spAutoFit/>
+          </a:bodyPr>
+          <a:lstStyle/>
+          <a:p>
+            <a:pPr algn="ctr"/>
+            <a:r>
+              <a:rPr lang="fr-CA" dirty="0"/>
+              <a:t>Data </a:t>
+            </a:r>
+            <a:r>
+              <a:rPr lang="fr-CA" dirty="0" err="1"/>
+              <a:t>field</a:t>
+            </a:r>
+            <a:r>
+              <a:rPr lang="fr-CA" dirty="0"/>
+              <a:t> descriptions</a:t>
+            </a:r>
+            <a:endParaRPr lang="en-US" dirty="0"/>
+          </a:p>
+        </p:txBody>
+      </p:sp>
+      <p:sp>
+        <p:nvSpPr>
+          <p:cNvPr id="89" name="TextBox 88">
+            <a:extLst>
+              <a:ext uri="{FF2B5EF4-FFF2-40B4-BE49-F238E27FC236}">
+                <a16:creationId xmlns:a16="http://schemas.microsoft.com/office/drawing/2014/main" id="{2E68841D-1BFD-BE80-589C-435B0817FDB0}"/>
+              </a:ext>
+            </a:extLst>
+          </p:cNvPr>
+          <p:cNvSpPr txBox="1"/>
+          <p:nvPr/>
+        </p:nvSpPr>
+        <p:spPr>
+          <a:xfrm>
+            <a:off x="8162861" y="3442001"/>
+            <a:ext cx="1339641" cy="646331"/>
+          </a:xfrm>
+          <a:prstGeom prst="rect">
+            <a:avLst/>
+          </a:prstGeom>
+          <a:noFill/>
+          <a:ln>
+            <a:solidFill>
+              <a:schemeClr val="bg2">
+                <a:lumMod val="50000"/>
+              </a:schemeClr>
+            </a:solidFill>
+          </a:ln>
+        </p:spPr>
+        <p:txBody>
+          <a:bodyPr wrap="square" rtlCol="0">
+            <a:spAutoFit/>
+          </a:bodyPr>
+          <a:lstStyle/>
+          <a:p>
+            <a:pPr algn="ctr"/>
+            <a:r>
+              <a:rPr lang="fr-CA" dirty="0"/>
+              <a:t>Protocol changes</a:t>
+            </a:r>
+            <a:endParaRPr lang="en-US" dirty="0"/>
+          </a:p>
+        </p:txBody>
+      </p:sp>
+      <p:cxnSp>
+        <p:nvCxnSpPr>
+          <p:cNvPr id="92" name="Straight Arrow Connector 91">
+            <a:extLst>
+              <a:ext uri="{FF2B5EF4-FFF2-40B4-BE49-F238E27FC236}">
+                <a16:creationId xmlns:a16="http://schemas.microsoft.com/office/drawing/2014/main" id="{AA11AA0D-F83A-4248-71AA-83221DFDA822}"/>
+              </a:ext>
+            </a:extLst>
+          </p:cNvPr>
+          <p:cNvCxnSpPr>
+            <a:cxnSpLocks/>
+            <a:stCxn id="48" idx="1"/>
+            <a:endCxn id="4" idx="0"/>
+          </p:cNvCxnSpPr>
+          <p:nvPr/>
+        </p:nvCxnSpPr>
+        <p:spPr>
+          <a:xfrm flipH="1">
+            <a:off x="6028365" y="2886690"/>
+            <a:ext cx="2134497" cy="2939299"/>
           </a:xfrm>
           <a:prstGeom prst="straightConnector1">
             <a:avLst/>
@@ -3966,24 +6144,24 @@
       </p:cxnSp>
       <p:cxnSp>
         <p:nvCxnSpPr>
-          <p:cNvPr id="45" name="Straight Arrow Connector 44">
-            <a:extLst>
-              <a:ext uri="{FF2B5EF4-FFF2-40B4-BE49-F238E27FC236}">
-                <a16:creationId xmlns:a16="http://schemas.microsoft.com/office/drawing/2014/main" id="{B8CEB4D2-C3ED-1547-E646-50D7D23F7F2D}"/>
+          <p:cNvPr id="95" name="Straight Arrow Connector 94">
+            <a:extLst>
+              <a:ext uri="{FF2B5EF4-FFF2-40B4-BE49-F238E27FC236}">
+                <a16:creationId xmlns:a16="http://schemas.microsoft.com/office/drawing/2014/main" id="{3123195D-8841-D879-58EB-1B16BE7E5958}"/>
               </a:ext>
             </a:extLst>
           </p:cNvPr>
           <p:cNvCxnSpPr>
             <a:cxnSpLocks/>
-            <a:stCxn id="9" idx="3"/>
-            <a:endCxn id="40" idx="1"/>
+            <a:stCxn id="89" idx="1"/>
+            <a:endCxn id="4" idx="0"/>
           </p:cNvCxnSpPr>
           <p:nvPr/>
         </p:nvCxnSpPr>
         <p:spPr>
-          <a:xfrm flipV="1">
-            <a:off x="5214391" y="3665052"/>
-            <a:ext cx="4038750" cy="507832"/>
+          <a:xfrm flipH="1">
+            <a:off x="6028365" y="3765167"/>
+            <a:ext cx="2134496" cy="2060822"/>
           </a:xfrm>
           <a:prstGeom prst="straightConnector1">
             <a:avLst/>
@@ -4009,10 +6187,10 @@
       </p:cxnSp>
       <p:sp>
         <p:nvSpPr>
-          <p:cNvPr id="64" name="TextBox 63">
-            <a:extLst>
-              <a:ext uri="{FF2B5EF4-FFF2-40B4-BE49-F238E27FC236}">
-                <a16:creationId xmlns:a16="http://schemas.microsoft.com/office/drawing/2014/main" id="{671D557F-A2F1-BA8C-CD3C-6FB5CB21885C}"/>
+          <p:cNvPr id="117" name="TextBox 116">
+            <a:extLst>
+              <a:ext uri="{FF2B5EF4-FFF2-40B4-BE49-F238E27FC236}">
+                <a16:creationId xmlns:a16="http://schemas.microsoft.com/office/drawing/2014/main" id="{C8012630-BD01-D928-F256-D0DBBF165C1F}"/>
               </a:ext>
             </a:extLst>
           </p:cNvPr>
@@ -4021,8 +6199,186 @@
         </p:nvSpPr>
         <p:spPr>
           <a:xfrm>
-            <a:off x="6223659" y="2209629"/>
-            <a:ext cx="1498663" cy="923330"/>
+            <a:off x="8414425" y="1060098"/>
+            <a:ext cx="836511" cy="461665"/>
+          </a:xfrm>
+          <a:prstGeom prst="rect">
+            <a:avLst/>
+          </a:prstGeom>
+          <a:noFill/>
+        </p:spPr>
+        <p:txBody>
+          <a:bodyPr wrap="none" rtlCol="0">
+            <a:spAutoFit/>
+          </a:bodyPr>
+          <a:lstStyle/>
+          <a:p>
+            <a:r>
+              <a:rPr lang="fr-CA" sz="2400" b="1" dirty="0" err="1"/>
+              <a:t>After</a:t>
+            </a:r>
+            <a:endParaRPr lang="en-US" sz="2400" b="1" dirty="0"/>
+          </a:p>
+        </p:txBody>
+      </p:sp>
+      <p:sp>
+        <p:nvSpPr>
+          <p:cNvPr id="151" name="TextBox 150">
+            <a:extLst>
+              <a:ext uri="{FF2B5EF4-FFF2-40B4-BE49-F238E27FC236}">
+                <a16:creationId xmlns:a16="http://schemas.microsoft.com/office/drawing/2014/main" id="{A7DFAD70-1F3C-0613-3BD2-326D8B7DC7E6}"/>
+              </a:ext>
+            </a:extLst>
+          </p:cNvPr>
+          <p:cNvSpPr txBox="1"/>
+          <p:nvPr/>
+        </p:nvSpPr>
+        <p:spPr>
+          <a:xfrm>
+            <a:off x="310392" y="293615"/>
+            <a:ext cx="4561505" cy="523220"/>
+          </a:xfrm>
+          <a:prstGeom prst="rect">
+            <a:avLst/>
+          </a:prstGeom>
+          <a:noFill/>
+        </p:spPr>
+        <p:txBody>
+          <a:bodyPr wrap="none" rtlCol="0">
+            <a:spAutoFit/>
+          </a:bodyPr>
+          <a:lstStyle/>
+          <a:p>
+            <a:r>
+              <a:rPr lang="fr-CA" sz="2800" b="1" dirty="0" err="1"/>
+              <a:t>Fieldwork</a:t>
+            </a:r>
+            <a:r>
+              <a:rPr lang="fr-CA" sz="2800" b="1" dirty="0"/>
+              <a:t> data management:</a:t>
+            </a:r>
+            <a:endParaRPr lang="en-US" sz="2800" b="1" dirty="0"/>
+          </a:p>
+        </p:txBody>
+      </p:sp>
+    </p:spTree>
+    <p:extLst>
+      <p:ext uri="{BB962C8B-B14F-4D97-AF65-F5344CB8AC3E}">
+        <p14:creationId xmlns:p14="http://schemas.microsoft.com/office/powerpoint/2010/main" val="4016247613"/>
+      </p:ext>
+    </p:extLst>
+  </p:cSld>
+  <p:clrMapOvr>
+    <a:masterClrMapping/>
+  </p:clrMapOvr>
+</p:sld>
+</file>
+
+<file path=ppt/slides/slide8.xml><?xml version="1.0" encoding="utf-8"?>
+<p:sld xmlns:a="http://schemas.openxmlformats.org/drawingml/2006/main" xmlns:r="http://schemas.openxmlformats.org/officeDocument/2006/relationships" xmlns:p="http://schemas.openxmlformats.org/presentationml/2006/main">
+  <p:cSld>
+    <p:spTree>
+      <p:nvGrpSpPr>
+        <p:cNvPr id="1" name=""/>
+        <p:cNvGrpSpPr/>
+        <p:nvPr/>
+      </p:nvGrpSpPr>
+      <p:grpSpPr>
+        <a:xfrm>
+          <a:off x="0" y="0"/>
+          <a:ext cx="0" cy="0"/>
+          <a:chOff x="0" y="0"/>
+          <a:chExt cx="0" cy="0"/>
+        </a:xfrm>
+      </p:grpSpPr>
+      <p:sp>
+        <p:nvSpPr>
+          <p:cNvPr id="2" name="Title 1">
+            <a:extLst>
+              <a:ext uri="{FF2B5EF4-FFF2-40B4-BE49-F238E27FC236}">
+                <a16:creationId xmlns:a16="http://schemas.microsoft.com/office/drawing/2014/main" id="{2DD7A6CF-A15B-9FB2-5E0F-E562CC9D11F6}"/>
+              </a:ext>
+            </a:extLst>
+          </p:cNvPr>
+          <p:cNvSpPr>
+            <a:spLocks noGrp="1"/>
+          </p:cNvSpPr>
+          <p:nvPr>
+            <p:ph type="title"/>
+          </p:nvPr>
+        </p:nvSpPr>
+        <p:spPr/>
+        <p:txBody>
+          <a:bodyPr/>
+          <a:lstStyle/>
+          <a:p>
+            <a:endParaRPr lang="en-US"/>
+          </a:p>
+        </p:txBody>
+      </p:sp>
+      <p:pic>
+        <p:nvPicPr>
+          <p:cNvPr id="4" name="Picture 2" descr="Data Life Cycle Models - SURA Research Data Management">
+            <a:extLst>
+              <a:ext uri="{FF2B5EF4-FFF2-40B4-BE49-F238E27FC236}">
+                <a16:creationId xmlns:a16="http://schemas.microsoft.com/office/drawing/2014/main" id="{5744B3AF-D91B-8F20-E445-0EC454D2918D}"/>
+              </a:ext>
+            </a:extLst>
+          </p:cNvPr>
+          <p:cNvPicPr>
+            <a:picLocks noChangeAspect="1" noChangeArrowheads="1"/>
+          </p:cNvPicPr>
+          <p:nvPr/>
+        </p:nvPicPr>
+        <p:blipFill>
+          <a:blip r:embed="rId2">
+            <a:extLst>
+              <a:ext uri="{28A0092B-C50C-407E-A947-70E740481C1C}">
+                <a14:useLocalDpi xmlns:a14="http://schemas.microsoft.com/office/drawing/2010/main" val="0"/>
+              </a:ext>
+            </a:extLst>
+          </a:blip>
+          <a:srcRect/>
+          <a:stretch>
+            <a:fillRect/>
+          </a:stretch>
+        </p:blipFill>
+        <p:spPr bwMode="auto">
+          <a:xfrm>
+            <a:off x="6859184" y="2491261"/>
+            <a:ext cx="4996028" cy="3379722"/>
+          </a:xfrm>
+          <a:prstGeom prst="rect">
+            <a:avLst/>
+          </a:prstGeom>
+          <a:noFill/>
+          <a:extLst>
+            <a:ext uri="{909E8E84-426E-40DD-AFC4-6F175D3DCCD1}">
+              <a14:hiddenFill xmlns:a14="http://schemas.microsoft.com/office/drawing/2010/main">
+                <a:solidFill>
+                  <a:srgbClr val="FFFFFF"/>
+                </a:solidFill>
+              </a14:hiddenFill>
+            </a:ext>
+          </a:extLst>
+        </p:spPr>
+      </p:pic>
+      <p:sp>
+        <p:nvSpPr>
+          <p:cNvPr id="5" name="TextBox 4">
+            <a:extLst>
+              <a:ext uri="{FF2B5EF4-FFF2-40B4-BE49-F238E27FC236}">
+                <a16:creationId xmlns:a16="http://schemas.microsoft.com/office/drawing/2014/main" id="{425E2D93-9999-3E05-3841-0A1BF7408C25}"/>
+              </a:ext>
+            </a:extLst>
+          </p:cNvPr>
+          <p:cNvSpPr txBox="1"/>
+          <p:nvPr/>
+        </p:nvSpPr>
+        <p:spPr>
+          <a:xfrm>
+            <a:off x="3313651" y="2760763"/>
+            <a:ext cx="588623" cy="369332"/>
           </a:xfrm>
           <a:prstGeom prst="rect">
             <a:avLst/>
@@ -4030,94 +6386,43 @@
           <a:noFill/>
           <a:ln>
             <a:solidFill>
-              <a:schemeClr val="bg2">
+              <a:schemeClr val="tx1">
                 <a:lumMod val="50000"/>
+                <a:lumOff val="50000"/>
               </a:schemeClr>
             </a:solidFill>
           </a:ln>
         </p:spPr>
         <p:txBody>
-          <a:bodyPr wrap="square" rtlCol="0">
+          <a:bodyPr wrap="none" rtlCol="0">
             <a:spAutoFit/>
           </a:bodyPr>
           <a:lstStyle/>
           <a:p>
-            <a:pPr algn="ctr"/>
             <a:r>
               <a:rPr lang="fr-CA" dirty="0"/>
-              <a:t>Issues and </a:t>
-            </a:r>
-            <a:r>
-              <a:rPr lang="fr-CA" dirty="0" err="1"/>
-              <a:t>protocol</a:t>
-            </a:r>
-            <a:r>
-              <a:rPr lang="fr-CA" dirty="0"/>
-              <a:t> changes</a:t>
+              <a:t>Plan</a:t>
             </a:r>
             <a:endParaRPr lang="en-US" dirty="0"/>
           </a:p>
         </p:txBody>
       </p:sp>
-      <p:cxnSp>
-        <p:nvCxnSpPr>
-          <p:cNvPr id="67" name="Straight Arrow Connector 66">
-            <a:extLst>
-              <a:ext uri="{FF2B5EF4-FFF2-40B4-BE49-F238E27FC236}">
-                <a16:creationId xmlns:a16="http://schemas.microsoft.com/office/drawing/2014/main" id="{70C9BBEE-497A-EB96-B8A3-C98D8E850EBC}"/>
-              </a:ext>
-            </a:extLst>
-          </p:cNvPr>
-          <p:cNvCxnSpPr>
-            <a:cxnSpLocks/>
-            <a:stCxn id="64" idx="3"/>
-            <a:endCxn id="4" idx="1"/>
-          </p:cNvCxnSpPr>
+      <p:sp>
+        <p:nvSpPr>
+          <p:cNvPr id="6" name="TextBox 5">
+            <a:extLst>
+              <a:ext uri="{FF2B5EF4-FFF2-40B4-BE49-F238E27FC236}">
+                <a16:creationId xmlns:a16="http://schemas.microsoft.com/office/drawing/2014/main" id="{404DF424-E0A5-7C4C-3F38-1A44B3244A27}"/>
+              </a:ext>
+            </a:extLst>
+          </p:cNvPr>
+          <p:cNvSpPr txBox="1"/>
           <p:nvPr/>
-        </p:nvCxnSpPr>
+        </p:nvSpPr>
         <p:spPr>
           <a:xfrm>
-            <a:off x="7722322" y="2671294"/>
-            <a:ext cx="1530820" cy="3877"/>
-          </a:xfrm>
-          <a:prstGeom prst="straightConnector1">
-            <a:avLst/>
-          </a:prstGeom>
-          <a:ln>
-            <a:tailEnd type="triangle"/>
-          </a:ln>
-        </p:spPr>
-        <p:style>
-          <a:lnRef idx="1">
-            <a:schemeClr val="accent1"/>
-          </a:lnRef>
-          <a:fillRef idx="0">
-            <a:schemeClr val="accent1"/>
-          </a:fillRef>
-          <a:effectRef idx="0">
-            <a:schemeClr val="accent1"/>
-          </a:effectRef>
-          <a:fontRef idx="minor">
-            <a:schemeClr val="tx1"/>
-          </a:fontRef>
-        </p:style>
-      </p:cxnSp>
-      <p:sp>
-        <p:nvSpPr>
-          <p:cNvPr id="71" name="TextBox 70">
-            <a:extLst>
-              <a:ext uri="{FF2B5EF4-FFF2-40B4-BE49-F238E27FC236}">
-                <a16:creationId xmlns:a16="http://schemas.microsoft.com/office/drawing/2014/main" id="{B7D69A0B-384E-1865-ECAC-802312D72331}"/>
-              </a:ext>
-            </a:extLst>
-          </p:cNvPr>
-          <p:cNvSpPr txBox="1"/>
-          <p:nvPr/>
-        </p:nvSpPr>
-        <p:spPr>
-          <a:xfrm>
-            <a:off x="8871656" y="5218878"/>
-            <a:ext cx="2038099" cy="646331"/>
+            <a:off x="1941379" y="2391431"/>
+            <a:ext cx="1038105" cy="369332"/>
           </a:xfrm>
           <a:prstGeom prst="rect">
             <a:avLst/>
@@ -4125,26 +6430,246 @@
           <a:noFill/>
           <a:ln>
             <a:solidFill>
-              <a:schemeClr val="bg2">
+              <a:schemeClr val="tx1">
                 <a:lumMod val="50000"/>
+                <a:lumOff val="50000"/>
               </a:schemeClr>
             </a:solidFill>
           </a:ln>
         </p:spPr>
         <p:txBody>
-          <a:bodyPr wrap="square" rtlCol="0">
+          <a:bodyPr wrap="none" rtlCol="0">
             <a:spAutoFit/>
           </a:bodyPr>
           <a:lstStyle/>
           <a:p>
-            <a:pPr algn="ctr"/>
             <a:r>
               <a:rPr lang="fr-CA" dirty="0"/>
-              <a:t>Data validation &amp; </a:t>
+              <a:t>Question</a:t>
+            </a:r>
+            <a:endParaRPr lang="en-US" dirty="0"/>
+          </a:p>
+        </p:txBody>
+      </p:sp>
+      <p:sp>
+        <p:nvSpPr>
+          <p:cNvPr id="7" name="TextBox 6">
+            <a:extLst>
+              <a:ext uri="{FF2B5EF4-FFF2-40B4-BE49-F238E27FC236}">
+                <a16:creationId xmlns:a16="http://schemas.microsoft.com/office/drawing/2014/main" id="{D096288F-8818-9048-BAFF-106C6D09EB62}"/>
+              </a:ext>
+            </a:extLst>
+          </p:cNvPr>
+          <p:cNvSpPr txBox="1"/>
+          <p:nvPr/>
+        </p:nvSpPr>
+        <p:spPr>
+          <a:xfrm>
+            <a:off x="4093467" y="3411737"/>
+            <a:ext cx="1155573" cy="369332"/>
+          </a:xfrm>
+          <a:prstGeom prst="rect">
+            <a:avLst/>
+          </a:prstGeom>
+          <a:noFill/>
+          <a:ln>
+            <a:solidFill>
+              <a:schemeClr val="tx1">
+                <a:lumMod val="50000"/>
+                <a:lumOff val="50000"/>
+              </a:schemeClr>
+            </a:solidFill>
+          </a:ln>
+        </p:spPr>
+        <p:txBody>
+          <a:bodyPr wrap="none" rtlCol="0">
+            <a:spAutoFit/>
+          </a:bodyPr>
+          <a:lstStyle/>
+          <a:p>
+            <a:r>
+              <a:rPr lang="fr-CA" dirty="0"/>
+              <a:t>Field </a:t>
             </a:r>
             <a:r>
               <a:rPr lang="fr-CA" dirty="0" err="1"/>
-              <a:t>review</a:t>
+              <a:t>work</a:t>
+            </a:r>
+            <a:endParaRPr lang="en-US" dirty="0"/>
+          </a:p>
+        </p:txBody>
+      </p:sp>
+      <p:sp>
+        <p:nvSpPr>
+          <p:cNvPr id="8" name="TextBox 7">
+            <a:extLst>
+              <a:ext uri="{FF2B5EF4-FFF2-40B4-BE49-F238E27FC236}">
+                <a16:creationId xmlns:a16="http://schemas.microsoft.com/office/drawing/2014/main" id="{1BE4F944-1E0D-9271-5204-C88359A22A36}"/>
+              </a:ext>
+            </a:extLst>
+          </p:cNvPr>
+          <p:cNvSpPr txBox="1"/>
+          <p:nvPr/>
+        </p:nvSpPr>
+        <p:spPr>
+          <a:xfrm>
+            <a:off x="4036400" y="4336623"/>
+            <a:ext cx="1000595" cy="369332"/>
+          </a:xfrm>
+          <a:prstGeom prst="rect">
+            <a:avLst/>
+          </a:prstGeom>
+          <a:noFill/>
+          <a:ln>
+            <a:solidFill>
+              <a:schemeClr val="tx1">
+                <a:lumMod val="50000"/>
+                <a:lumOff val="50000"/>
+              </a:schemeClr>
+            </a:solidFill>
+          </a:ln>
+        </p:spPr>
+        <p:txBody>
+          <a:bodyPr wrap="none" rtlCol="0">
+            <a:spAutoFit/>
+          </a:bodyPr>
+          <a:lstStyle/>
+          <a:p>
+            <a:r>
+              <a:rPr lang="fr-CA" dirty="0" err="1"/>
+              <a:t>Describe</a:t>
+            </a:r>
+            <a:endParaRPr lang="en-US" dirty="0"/>
+          </a:p>
+        </p:txBody>
+      </p:sp>
+      <p:sp>
+        <p:nvSpPr>
+          <p:cNvPr id="9" name="TextBox 8">
+            <a:extLst>
+              <a:ext uri="{FF2B5EF4-FFF2-40B4-BE49-F238E27FC236}">
+                <a16:creationId xmlns:a16="http://schemas.microsoft.com/office/drawing/2014/main" id="{112F8768-AE47-E196-DEE3-E861E480CEDB}"/>
+              </a:ext>
+            </a:extLst>
+          </p:cNvPr>
+          <p:cNvSpPr txBox="1"/>
+          <p:nvPr/>
+        </p:nvSpPr>
+        <p:spPr>
+          <a:xfrm>
+            <a:off x="3504844" y="5132786"/>
+            <a:ext cx="1005596" cy="369332"/>
+          </a:xfrm>
+          <a:prstGeom prst="rect">
+            <a:avLst/>
+          </a:prstGeom>
+          <a:noFill/>
+          <a:ln>
+            <a:solidFill>
+              <a:schemeClr val="tx1">
+                <a:lumMod val="50000"/>
+                <a:lumOff val="50000"/>
+              </a:schemeClr>
+            </a:solidFill>
+          </a:ln>
+        </p:spPr>
+        <p:txBody>
+          <a:bodyPr wrap="none" rtlCol="0">
+            <a:spAutoFit/>
+          </a:bodyPr>
+          <a:lstStyle/>
+          <a:p>
+            <a:r>
+              <a:rPr lang="fr-CA" dirty="0" err="1"/>
+              <a:t>Organize</a:t>
+            </a:r>
+            <a:endParaRPr lang="en-US" dirty="0"/>
+          </a:p>
+        </p:txBody>
+      </p:sp>
+      <p:sp>
+        <p:nvSpPr>
+          <p:cNvPr id="10" name="TextBox 9">
+            <a:extLst>
+              <a:ext uri="{FF2B5EF4-FFF2-40B4-BE49-F238E27FC236}">
+                <a16:creationId xmlns:a16="http://schemas.microsoft.com/office/drawing/2014/main" id="{A9AEE948-F589-F414-7AEF-9B11E4CFE044}"/>
+              </a:ext>
+            </a:extLst>
+          </p:cNvPr>
+          <p:cNvSpPr txBox="1"/>
+          <p:nvPr/>
+        </p:nvSpPr>
+        <p:spPr>
+          <a:xfrm>
+            <a:off x="1877015" y="5040616"/>
+            <a:ext cx="906915" cy="369332"/>
+          </a:xfrm>
+          <a:prstGeom prst="rect">
+            <a:avLst/>
+          </a:prstGeom>
+          <a:noFill/>
+          <a:ln>
+            <a:solidFill>
+              <a:schemeClr val="tx1">
+                <a:lumMod val="50000"/>
+                <a:lumOff val="50000"/>
+              </a:schemeClr>
+            </a:solidFill>
+          </a:ln>
+        </p:spPr>
+        <p:txBody>
+          <a:bodyPr wrap="none" rtlCol="0">
+            <a:spAutoFit/>
+          </a:bodyPr>
+          <a:lstStyle/>
+          <a:p>
+            <a:r>
+              <a:rPr lang="fr-CA" dirty="0" err="1"/>
+              <a:t>Analyze</a:t>
+            </a:r>
+            <a:endParaRPr lang="en-US" dirty="0"/>
+          </a:p>
+        </p:txBody>
+      </p:sp>
+      <p:sp>
+        <p:nvSpPr>
+          <p:cNvPr id="11" name="TextBox 10">
+            <a:extLst>
+              <a:ext uri="{FF2B5EF4-FFF2-40B4-BE49-F238E27FC236}">
+                <a16:creationId xmlns:a16="http://schemas.microsoft.com/office/drawing/2014/main" id="{2D5F2711-3117-89F2-CDF3-3E9631B253A9}"/>
+              </a:ext>
+            </a:extLst>
+          </p:cNvPr>
+          <p:cNvSpPr txBox="1"/>
+          <p:nvPr/>
+        </p:nvSpPr>
+        <p:spPr>
+          <a:xfrm>
+            <a:off x="838200" y="3690557"/>
+            <a:ext cx="1020216" cy="369332"/>
+          </a:xfrm>
+          <a:prstGeom prst="rect">
+            <a:avLst/>
+          </a:prstGeom>
+          <a:noFill/>
+          <a:ln>
+            <a:solidFill>
+              <a:schemeClr val="tx1">
+                <a:lumMod val="50000"/>
+                <a:lumOff val="50000"/>
+              </a:schemeClr>
+            </a:solidFill>
+          </a:ln>
+        </p:spPr>
+        <p:txBody>
+          <a:bodyPr wrap="none" rtlCol="0">
+            <a:spAutoFit/>
+          </a:bodyPr>
+          <a:lstStyle/>
+          <a:p>
+            <a:r>
+              <a:rPr lang="fr-CA" dirty="0"/>
+              <a:t>Write-up</a:t>
             </a:r>
             <a:endParaRPr lang="en-US" dirty="0"/>
           </a:p>
@@ -4153,7 +6678,7 @@
     </p:spTree>
     <p:extLst>
       <p:ext uri="{BB962C8B-B14F-4D97-AF65-F5344CB8AC3E}">
-        <p14:creationId xmlns:p14="http://schemas.microsoft.com/office/powerpoint/2010/main" val="182224774"/>
+        <p14:creationId xmlns:p14="http://schemas.microsoft.com/office/powerpoint/2010/main" val="2993920994"/>
       </p:ext>
     </p:extLst>
   </p:cSld>

</xml_diff>